<commit_message>
doc(power point): variété des requêtes
</commit_message>
<xml_diff>
--- a/Criteria Mix.pptx
+++ b/Criteria Mix.pptx
@@ -14,8 +14,9 @@
     <p:sldId id="271" r:id="rId8"/>
     <p:sldId id="261" r:id="rId9"/>
     <p:sldId id="262" r:id="rId10"/>
-    <p:sldId id="263" r:id="rId11"/>
-    <p:sldId id="264" r:id="rId12"/>
+    <p:sldId id="264" r:id="rId11"/>
+    <p:sldId id="275" r:id="rId12"/>
+    <p:sldId id="276" r:id="rId13"/>
   </p:sldIdLst>
   <p:sldSz cx="9144000" cy="6858000" type="screen4x3"/>
   <p:notesSz cx="6858000" cy="9144000"/>
@@ -3204,8 +3205,12 @@
           <a:lstStyle/>
           <a:p>
             <a:r>
+              <a:rPr lang="fr-FR" dirty="0"/>
+              <a:t>Variété des </a:t>
+            </a:r>
+            <a:r>
               <a:rPr lang="fr-FR" dirty="0" smtClean="0"/>
-              <a:t>Relation entre critères et filtres</a:t>
+              <a:t>requêtes</a:t>
             </a:r>
             <a:endParaRPr lang="en-US" dirty="0"/>
           </a:p>
@@ -3221,37 +3226,123 @@
             <p:ph idx="1"/>
           </p:nvPr>
         </p:nvSpPr>
-        <p:spPr/>
+        <p:spPr>
+          <a:xfrm>
+            <a:off x="467544" y="1700808"/>
+            <a:ext cx="8229600" cy="4525963"/>
+          </a:xfrm>
+        </p:spPr>
         <p:txBody>
           <a:bodyPr/>
           <a:lstStyle/>
           <a:p>
             <a:r>
               <a:rPr lang="fr-FR" dirty="0" smtClean="0"/>
-              <a:t>Cas simple : à 1 critère correspond 1 filtre ; pas trop difficile à programmer</a:t>
-            </a:r>
-          </a:p>
-          <a:p>
+              <a:t>Pour un même panneau de sélection, on peut obtenir des requêtes de forme variée.</a:t>
+            </a:r>
+          </a:p>
+          <a:p>
+            <a:r>
+              <a:rPr lang="fr-FR" dirty="0" smtClean="0"/>
+              <a:t>Exemple : </a:t>
+            </a:r>
+          </a:p>
+          <a:p>
+            <a:pPr marL="0" indent="0">
+              <a:buNone/>
+            </a:pPr>
+            <a:endParaRPr lang="fr-FR" dirty="0" smtClean="0"/>
+          </a:p>
+          <a:p>
+            <a:pPr marL="0" indent="0">
+              <a:buNone/>
+            </a:pPr>
             <a:endParaRPr lang="fr-FR" dirty="0"/>
           </a:p>
           <a:p>
+            <a:pPr marL="0" indent="0">
+              <a:buNone/>
+            </a:pPr>
             <a:endParaRPr lang="fr-FR" dirty="0" smtClean="0"/>
           </a:p>
           <a:p>
-            <a:r>
-              <a:rPr lang="fr-FR" dirty="0" smtClean="0"/>
-              <a:t>Plus compliqué : il faut faire une jointure pour que le filtre exprime le critère</a:t>
-            </a:r>
-          </a:p>
-          <a:p>
+            <a:pPr marL="0" indent="0">
+              <a:buNone/>
+            </a:pPr>
+            <a:endParaRPr lang="fr-FR" dirty="0"/>
+          </a:p>
+          <a:p>
+            <a:pPr marL="0" indent="0">
+              <a:buNone/>
+            </a:pPr>
+            <a:endParaRPr lang="fr-FR" dirty="0" smtClean="0"/>
+          </a:p>
+          <a:p>
+            <a:pPr marL="0" indent="0">
+              <a:buNone/>
+            </a:pPr>
             <a:endParaRPr lang="en-US" dirty="0"/>
           </a:p>
         </p:txBody>
       </p:sp>
+      <p:pic>
+        <p:nvPicPr>
+          <p:cNvPr id="1027" name="Picture 3"/>
+          <p:cNvPicPr>
+            <a:picLocks noChangeAspect="1" noChangeArrowheads="1"/>
+          </p:cNvPicPr>
+          <p:nvPr/>
+        </p:nvPicPr>
+        <p:blipFill>
+          <a:blip r:embed="rId2">
+            <a:extLst>
+              <a:ext uri="{28A0092B-C50C-407E-A947-70E740481C1C}">
+                <a14:useLocalDpi xmlns:a14="http://schemas.microsoft.com/office/drawing/2010/main" val="0"/>
+              </a:ext>
+            </a:extLst>
+          </a:blip>
+          <a:srcRect/>
+          <a:stretch>
+            <a:fillRect/>
+          </a:stretch>
+        </p:blipFill>
+        <p:spPr bwMode="auto">
+          <a:xfrm>
+            <a:off x="1331640" y="3447809"/>
+            <a:ext cx="6483350" cy="2692400"/>
+          </a:xfrm>
+          <a:prstGeom prst="rect">
+            <a:avLst/>
+          </a:prstGeom>
+          <a:noFill/>
+          <a:ln>
+            <a:noFill/>
+          </a:ln>
+          <a:extLst>
+            <a:ext uri="{909E8E84-426E-40DD-AFC4-6F175D3DCCD1}">
+              <a14:hiddenFill xmlns:a14="http://schemas.microsoft.com/office/drawing/2010/main">
+                <a:solidFill>
+                  <a:schemeClr val="accent1"/>
+                </a:solidFill>
+              </a14:hiddenFill>
+            </a:ext>
+            <a:ext uri="{91240B29-F687-4F45-9708-019B960494DF}">
+              <a14:hiddenLine xmlns:a14="http://schemas.microsoft.com/office/drawing/2010/main" w="9525">
+                <a:solidFill>
+                  <a:schemeClr val="tx1"/>
+                </a:solidFill>
+                <a:miter lim="800000"/>
+                <a:headEnd/>
+                <a:tailEnd/>
+              </a14:hiddenLine>
+            </a:ext>
+          </a:extLst>
+        </p:spPr>
+      </p:pic>
     </p:spTree>
     <p:extLst>
       <p:ext uri="{BB962C8B-B14F-4D97-AF65-F5344CB8AC3E}">
-        <p14:creationId xmlns:p14="http://schemas.microsoft.com/office/powerpoint/2010/main" val="1746448546"/>
+        <p14:creationId xmlns:p14="http://schemas.microsoft.com/office/powerpoint/2010/main" val="3364463895"/>
       </p:ext>
     </p:extLst>
   </p:cSld>
@@ -3297,20 +3388,878 @@
         </p:nvSpPr>
         <p:spPr/>
         <p:txBody>
+          <a:bodyPr>
+            <a:normAutofit/>
+          </a:bodyPr>
+          <a:lstStyle/>
+          <a:p>
+            <a:r>
+              <a:rPr lang="fr-FR" dirty="0" smtClean="0"/>
+              <a:t>Au Last </a:t>
+            </a:r>
+            <a:r>
+              <a:rPr lang="fr-FR" dirty="0"/>
+              <a:t>Chance </a:t>
+            </a:r>
+            <a:r>
+              <a:rPr lang="fr-FR" dirty="0" smtClean="0"/>
+              <a:t>Saloon</a:t>
+            </a:r>
+            <a:endParaRPr lang="en-US" dirty="0"/>
+          </a:p>
+        </p:txBody>
+      </p:sp>
+      <p:sp>
+        <p:nvSpPr>
+          <p:cNvPr id="3" name="Espace réservé du contenu 2"/>
+          <p:cNvSpPr>
+            <a:spLocks noGrp="1"/>
+          </p:cNvSpPr>
+          <p:nvPr>
+            <p:ph sz="half" idx="1"/>
+          </p:nvPr>
+        </p:nvSpPr>
+        <p:spPr>
+          <a:xfrm>
+            <a:off x="457200" y="1600200"/>
+            <a:ext cx="3394720" cy="4525963"/>
+          </a:xfrm>
+        </p:spPr>
+        <p:txBody>
+          <a:bodyPr>
+            <a:normAutofit/>
+          </a:bodyPr>
+          <a:lstStyle/>
+          <a:p>
+            <a:pPr marL="0" indent="0">
+              <a:buNone/>
+            </a:pPr>
+            <a:r>
+              <a:rPr lang="fr-FR" dirty="0"/>
+              <a:t>… </a:t>
+            </a:r>
+            <a:r>
+              <a:rPr lang="fr-FR" dirty="0" smtClean="0"/>
+              <a:t>Lucky </a:t>
+            </a:r>
+            <a:r>
+              <a:rPr lang="fr-FR" dirty="0"/>
+              <a:t>Luke cherche une danseuse</a:t>
+            </a:r>
+            <a:r>
+              <a:rPr lang="fr-FR" dirty="0" smtClean="0"/>
+              <a:t>.</a:t>
+            </a:r>
+            <a:endParaRPr lang="fr-FR" dirty="0"/>
+          </a:p>
+          <a:p>
+            <a:r>
+              <a:rPr lang="fr-FR" dirty="0"/>
+              <a:t>Elle est blonde</a:t>
+            </a:r>
+            <a:r>
+              <a:rPr lang="fr-FR" dirty="0" smtClean="0"/>
+              <a:t>.</a:t>
+            </a:r>
+          </a:p>
+          <a:p>
+            <a:endParaRPr lang="fr-FR" dirty="0" smtClean="0"/>
+          </a:p>
+          <a:p>
+            <a:endParaRPr lang="fr-FR" dirty="0"/>
+          </a:p>
+          <a:p>
+            <a:r>
+              <a:rPr lang="fr-FR" dirty="0" smtClean="0"/>
+              <a:t>Elle </a:t>
+            </a:r>
+            <a:r>
+              <a:rPr lang="fr-FR" dirty="0"/>
+              <a:t>est blonde </a:t>
+            </a:r>
+            <a:r>
+              <a:rPr lang="fr-FR" dirty="0" smtClean="0"/>
+              <a:t>et elle porte une jarretière violette.</a:t>
+            </a:r>
+            <a:endParaRPr lang="fr-FR" dirty="0"/>
+          </a:p>
+          <a:p>
+            <a:endParaRPr lang="en-US" dirty="0"/>
+          </a:p>
+        </p:txBody>
+      </p:sp>
+      <p:sp>
+        <p:nvSpPr>
+          <p:cNvPr id="4" name="Espace réservé du contenu 3"/>
+          <p:cNvSpPr>
+            <a:spLocks noGrp="1"/>
+          </p:cNvSpPr>
+          <p:nvPr>
+            <p:ph sz="half" idx="2"/>
+          </p:nvPr>
+        </p:nvSpPr>
+        <p:spPr>
+          <a:xfrm>
+            <a:off x="4139952" y="1600200"/>
+            <a:ext cx="4546848" cy="4525963"/>
+          </a:xfrm>
+        </p:spPr>
+        <p:txBody>
+          <a:bodyPr>
+            <a:normAutofit/>
+          </a:bodyPr>
+          <a:lstStyle/>
+          <a:p>
+            <a:endParaRPr lang="en-US" sz="2000" b="1" dirty="0" smtClean="0">
+              <a:solidFill>
+                <a:schemeClr val="accent1"/>
+              </a:solidFill>
+            </a:endParaRPr>
+          </a:p>
+          <a:p>
+            <a:endParaRPr lang="en-US" sz="2000" b="1" dirty="0">
+              <a:solidFill>
+                <a:schemeClr val="accent1"/>
+              </a:solidFill>
+            </a:endParaRPr>
+          </a:p>
+          <a:p>
+            <a:r>
+              <a:rPr lang="en-US" sz="2000" b="1" dirty="0" smtClean="0">
+                <a:solidFill>
+                  <a:schemeClr val="accent1"/>
+                </a:solidFill>
+              </a:rPr>
+              <a:t>SELECT </a:t>
+            </a:r>
+            <a:r>
+              <a:rPr lang="en-US" sz="2000" b="1" dirty="0">
+                <a:solidFill>
+                  <a:schemeClr val="accent1"/>
+                </a:solidFill>
+              </a:rPr>
+              <a:t>dancer.name </a:t>
+            </a:r>
+            <a:endParaRPr lang="en-US" sz="2000" b="1" dirty="0" smtClean="0">
+              <a:solidFill>
+                <a:schemeClr val="accent1"/>
+              </a:solidFill>
+            </a:endParaRPr>
+          </a:p>
+          <a:p>
+            <a:pPr marL="400050" lvl="1" indent="0">
+              <a:buNone/>
+            </a:pPr>
+            <a:r>
+              <a:rPr lang="en-US" sz="2000" b="1" dirty="0" smtClean="0">
+                <a:solidFill>
+                  <a:schemeClr val="accent1"/>
+                </a:solidFill>
+              </a:rPr>
+              <a:t>FROM </a:t>
+            </a:r>
+            <a:r>
+              <a:rPr lang="en-US" sz="2000" b="1" dirty="0">
+                <a:solidFill>
+                  <a:schemeClr val="accent1"/>
+                </a:solidFill>
+              </a:rPr>
+              <a:t>Dancer </a:t>
+            </a:r>
+            <a:r>
+              <a:rPr lang="en-US" sz="2000" b="1" dirty="0" err="1" smtClean="0">
+                <a:solidFill>
+                  <a:schemeClr val="accent1"/>
+                </a:solidFill>
+              </a:rPr>
+              <a:t>dancer</a:t>
+            </a:r>
+            <a:r>
+              <a:rPr lang="en-US" sz="2000" b="1" dirty="0" smtClean="0">
+                <a:solidFill>
+                  <a:schemeClr val="accent1"/>
+                </a:solidFill>
+              </a:rPr>
+              <a:t> </a:t>
+            </a:r>
+          </a:p>
+          <a:p>
+            <a:pPr marL="400050" lvl="1" indent="0">
+              <a:buNone/>
+            </a:pPr>
+            <a:r>
+              <a:rPr lang="en-US" sz="2000" b="1" dirty="0" smtClean="0"/>
+              <a:t>WHERE </a:t>
+            </a:r>
+            <a:r>
+              <a:rPr lang="en-US" sz="2000" b="1" dirty="0" err="1"/>
+              <a:t>dancer.hairColor</a:t>
+            </a:r>
+            <a:r>
+              <a:rPr lang="en-US" sz="2000" b="1" dirty="0"/>
+              <a:t> = </a:t>
+            </a:r>
+            <a:r>
+              <a:rPr lang="en-US" sz="2000" b="1" dirty="0" smtClean="0"/>
+              <a:t>'blond‘</a:t>
+            </a:r>
+          </a:p>
+          <a:p>
+            <a:pPr marL="400050" lvl="1" indent="0">
+              <a:buNone/>
+            </a:pPr>
+            <a:endParaRPr lang="en-US" sz="2000" b="1" dirty="0"/>
+          </a:p>
+          <a:p>
+            <a:r>
+              <a:rPr lang="en-US" sz="2000" b="1" dirty="0">
+                <a:solidFill>
+                  <a:schemeClr val="accent1"/>
+                </a:solidFill>
+              </a:rPr>
+              <a:t>SELECT dancer.name </a:t>
+            </a:r>
+            <a:endParaRPr lang="en-US" sz="2000" b="1" dirty="0" smtClean="0">
+              <a:solidFill>
+                <a:schemeClr val="accent1"/>
+              </a:solidFill>
+            </a:endParaRPr>
+          </a:p>
+          <a:p>
+            <a:pPr marL="400050" lvl="1" indent="0">
+              <a:buNone/>
+            </a:pPr>
+            <a:r>
+              <a:rPr lang="en-US" sz="2000" b="1" dirty="0" smtClean="0">
+                <a:solidFill>
+                  <a:schemeClr val="accent1"/>
+                </a:solidFill>
+              </a:rPr>
+              <a:t>FROM </a:t>
+            </a:r>
+            <a:r>
+              <a:rPr lang="en-US" sz="2000" b="1" dirty="0">
+                <a:solidFill>
+                  <a:schemeClr val="accent1"/>
+                </a:solidFill>
+              </a:rPr>
+              <a:t>Dancer </a:t>
+            </a:r>
+            <a:r>
+              <a:rPr lang="en-US" sz="2000" b="1" dirty="0" err="1">
+                <a:solidFill>
+                  <a:schemeClr val="accent1"/>
+                </a:solidFill>
+              </a:rPr>
+              <a:t>dancer</a:t>
+            </a:r>
+            <a:r>
+              <a:rPr lang="en-US" sz="2000" b="1" dirty="0">
+                <a:solidFill>
+                  <a:schemeClr val="accent1"/>
+                </a:solidFill>
+              </a:rPr>
+              <a:t> </a:t>
+            </a:r>
+            <a:endParaRPr lang="en-US" sz="2000" b="1" dirty="0" smtClean="0">
+              <a:solidFill>
+                <a:schemeClr val="accent1"/>
+              </a:solidFill>
+            </a:endParaRPr>
+          </a:p>
+          <a:p>
+            <a:pPr marL="400050" lvl="1" indent="0">
+              <a:buNone/>
+            </a:pPr>
+            <a:r>
+              <a:rPr lang="en-US" sz="2000" b="1" dirty="0" smtClean="0">
+                <a:solidFill>
+                  <a:srgbClr val="7030A0"/>
+                </a:solidFill>
+              </a:rPr>
+              <a:t>, </a:t>
+            </a:r>
+            <a:r>
+              <a:rPr lang="en-US" sz="2000" b="1" dirty="0">
+                <a:solidFill>
+                  <a:srgbClr val="7030A0"/>
+                </a:solidFill>
+              </a:rPr>
+              <a:t>Garter </a:t>
+            </a:r>
+            <a:r>
+              <a:rPr lang="en-US" sz="2000" b="1" dirty="0" err="1">
+                <a:solidFill>
+                  <a:srgbClr val="7030A0"/>
+                </a:solidFill>
+              </a:rPr>
+              <a:t>garter</a:t>
+            </a:r>
+            <a:r>
+              <a:rPr lang="en-US" sz="2000" b="1" dirty="0">
+                <a:solidFill>
+                  <a:srgbClr val="7030A0"/>
+                </a:solidFill>
+              </a:rPr>
+              <a:t> </a:t>
+            </a:r>
+            <a:endParaRPr lang="en-US" sz="2000" b="1" dirty="0" smtClean="0">
+              <a:solidFill>
+                <a:srgbClr val="7030A0"/>
+              </a:solidFill>
+            </a:endParaRPr>
+          </a:p>
+          <a:p>
+            <a:pPr marL="400050" lvl="1" indent="0">
+              <a:buNone/>
+            </a:pPr>
+            <a:r>
+              <a:rPr lang="en-US" sz="2000" b="1" dirty="0" smtClean="0"/>
+              <a:t>WHERE </a:t>
+            </a:r>
+            <a:r>
+              <a:rPr lang="en-US" sz="2000" b="1" dirty="0" err="1"/>
+              <a:t>dancer.hairColor</a:t>
+            </a:r>
+            <a:r>
+              <a:rPr lang="en-US" sz="2000" b="1" dirty="0"/>
+              <a:t> = </a:t>
+            </a:r>
+            <a:r>
+              <a:rPr lang="en-US" sz="2000" b="1" dirty="0" smtClean="0"/>
+              <a:t>'blond' </a:t>
+            </a:r>
+          </a:p>
+          <a:p>
+            <a:pPr marL="400050" lvl="1" indent="0">
+              <a:buNone/>
+            </a:pPr>
+            <a:r>
+              <a:rPr lang="en-US" sz="2000" b="1" dirty="0" smtClean="0">
+                <a:solidFill>
+                  <a:srgbClr val="7030A0"/>
+                </a:solidFill>
+              </a:rPr>
+              <a:t>AND </a:t>
+            </a:r>
+            <a:r>
+              <a:rPr lang="en-US" sz="2000" b="1" dirty="0" err="1">
+                <a:solidFill>
+                  <a:srgbClr val="7030A0"/>
+                </a:solidFill>
+              </a:rPr>
+              <a:t>garter.color</a:t>
+            </a:r>
+            <a:r>
+              <a:rPr lang="en-US" sz="2000" b="1" dirty="0">
+                <a:solidFill>
+                  <a:srgbClr val="7030A0"/>
+                </a:solidFill>
+              </a:rPr>
+              <a:t> = </a:t>
+            </a:r>
+            <a:r>
+              <a:rPr lang="en-US" sz="2000" b="1" dirty="0" smtClean="0">
+                <a:solidFill>
+                  <a:srgbClr val="7030A0"/>
+                </a:solidFill>
+              </a:rPr>
+              <a:t>‘purple' </a:t>
+            </a:r>
+          </a:p>
+          <a:p>
+            <a:pPr marL="400050" lvl="1" indent="0">
+              <a:buNone/>
+            </a:pPr>
+            <a:r>
+              <a:rPr lang="en-US" sz="2000" b="1" dirty="0" smtClean="0">
+                <a:solidFill>
+                  <a:srgbClr val="7030A0"/>
+                </a:solidFill>
+              </a:rPr>
+              <a:t>AND </a:t>
+            </a:r>
+            <a:r>
+              <a:rPr lang="en-US" sz="2000" b="1" dirty="0" err="1">
+                <a:solidFill>
+                  <a:srgbClr val="7030A0"/>
+                </a:solidFill>
+              </a:rPr>
+              <a:t>garter.owner</a:t>
+            </a:r>
+            <a:r>
+              <a:rPr lang="en-US" sz="2000" b="1" dirty="0">
+                <a:solidFill>
+                  <a:srgbClr val="7030A0"/>
+                </a:solidFill>
+              </a:rPr>
+              <a:t> = dancer.id</a:t>
+            </a:r>
+          </a:p>
+          <a:p>
+            <a:pPr marL="0" indent="0">
+              <a:buNone/>
+            </a:pPr>
+            <a:endParaRPr lang="en-US" dirty="0"/>
+          </a:p>
+        </p:txBody>
+      </p:sp>
+    </p:spTree>
+    <p:extLst>
+      <p:ext uri="{BB962C8B-B14F-4D97-AF65-F5344CB8AC3E}">
+        <p14:creationId xmlns:p14="http://schemas.microsoft.com/office/powerpoint/2010/main" val="312607784"/>
+      </p:ext>
+    </p:extLst>
+  </p:cSld>
+  <p:clrMapOvr>
+    <a:masterClrMapping/>
+  </p:clrMapOvr>
+</p:sld>
+</file>
+
+<file path=ppt/slides/slide12.xml><?xml version="1.0" encoding="utf-8"?>
+<p:sld xmlns:a="http://schemas.openxmlformats.org/drawingml/2006/main" xmlns:r="http://schemas.openxmlformats.org/officeDocument/2006/relationships" xmlns:p="http://schemas.openxmlformats.org/presentationml/2006/main">
+  <p:cSld>
+    <p:spTree>
+      <p:nvGrpSpPr>
+        <p:cNvPr id="1" name=""/>
+        <p:cNvGrpSpPr/>
+        <p:nvPr/>
+      </p:nvGrpSpPr>
+      <p:grpSpPr>
+        <a:xfrm>
+          <a:off x="0" y="0"/>
+          <a:ext cx="0" cy="0"/>
+          <a:chOff x="0" y="0"/>
+          <a:chExt cx="0" cy="0"/>
+        </a:xfrm>
+      </p:grpSpPr>
+      <p:sp>
+        <p:nvSpPr>
+          <p:cNvPr id="2" name="Titre 1"/>
+          <p:cNvSpPr>
+            <a:spLocks noGrp="1"/>
+          </p:cNvSpPr>
+          <p:nvPr>
+            <p:ph type="title"/>
+          </p:nvPr>
+        </p:nvSpPr>
+        <p:spPr/>
+        <p:txBody>
           <a:bodyPr/>
           <a:lstStyle/>
           <a:p>
             <a:r>
               <a:rPr lang="fr-FR" dirty="0" smtClean="0"/>
-              <a:t>Exemple de cas compliqué</a:t>
+              <a:t> </a:t>
             </a:r>
             <a:endParaRPr lang="en-US" dirty="0"/>
+          </a:p>
+        </p:txBody>
+      </p:sp>
+      <p:sp>
+        <p:nvSpPr>
+          <p:cNvPr id="3" name="Espace réservé du contenu 2"/>
+          <p:cNvSpPr>
+            <a:spLocks noGrp="1"/>
+          </p:cNvSpPr>
+          <p:nvPr>
+            <p:ph sz="half" idx="1"/>
+          </p:nvPr>
+        </p:nvSpPr>
+        <p:spPr>
+          <a:xfrm>
+            <a:off x="467544" y="2348880"/>
+            <a:ext cx="3106688" cy="3701008"/>
+          </a:xfrm>
+        </p:spPr>
+        <p:txBody>
+          <a:bodyPr>
+            <a:normAutofit/>
+          </a:bodyPr>
+          <a:lstStyle/>
+          <a:p>
+            <a:r>
+              <a:rPr lang="fr-FR" dirty="0"/>
+              <a:t>Elle est </a:t>
+            </a:r>
+            <a:r>
+              <a:rPr lang="fr-FR" dirty="0" smtClean="0"/>
+              <a:t>blonde, elle </a:t>
+            </a:r>
+            <a:r>
+              <a:rPr lang="fr-FR" dirty="0"/>
+              <a:t>porte une jarretière </a:t>
+            </a:r>
+            <a:r>
+              <a:rPr lang="fr-FR" dirty="0" smtClean="0"/>
+              <a:t>violette</a:t>
+            </a:r>
+            <a:r>
+              <a:rPr lang="fr-FR" dirty="0"/>
+              <a:t> </a:t>
+            </a:r>
+            <a:r>
+              <a:rPr lang="fr-FR" dirty="0" smtClean="0"/>
+              <a:t>et elle a un grain de beauté sur la </a:t>
+            </a:r>
+            <a:r>
+              <a:rPr lang="fr-FR" dirty="0" err="1" smtClean="0"/>
+              <a:t>xxxxx</a:t>
+            </a:r>
+            <a:r>
+              <a:rPr lang="fr-FR" dirty="0" smtClean="0"/>
+              <a:t>  joue.</a:t>
+            </a:r>
+            <a:endParaRPr lang="fr-FR" dirty="0"/>
+          </a:p>
+          <a:p>
+            <a:endParaRPr lang="en-US" dirty="0"/>
+          </a:p>
+          <a:p>
+            <a:endParaRPr lang="en-US" dirty="0"/>
+          </a:p>
+        </p:txBody>
+      </p:sp>
+      <p:sp>
+        <p:nvSpPr>
+          <p:cNvPr id="4" name="Espace réservé du contenu 3"/>
+          <p:cNvSpPr>
+            <a:spLocks noGrp="1"/>
+          </p:cNvSpPr>
+          <p:nvPr>
+            <p:ph sz="half" idx="2"/>
+          </p:nvPr>
+        </p:nvSpPr>
+        <p:spPr>
+          <a:xfrm>
+            <a:off x="3851920" y="2431740"/>
+            <a:ext cx="4834880" cy="3773016"/>
+          </a:xfrm>
+        </p:spPr>
+        <p:txBody>
+          <a:bodyPr>
+            <a:normAutofit/>
+          </a:bodyPr>
+          <a:lstStyle/>
+          <a:p>
+            <a:r>
+              <a:rPr lang="en-US" sz="2000" b="1" dirty="0">
+                <a:solidFill>
+                  <a:schemeClr val="accent1"/>
+                </a:solidFill>
+              </a:rPr>
+              <a:t>SELECT dancer.name </a:t>
+            </a:r>
+          </a:p>
+          <a:p>
+            <a:pPr marL="400050" lvl="1" indent="0">
+              <a:buNone/>
+            </a:pPr>
+            <a:r>
+              <a:rPr lang="en-US" sz="2000" b="1" dirty="0">
+                <a:solidFill>
+                  <a:schemeClr val="accent1"/>
+                </a:solidFill>
+              </a:rPr>
+              <a:t>FROM Dancer </a:t>
+            </a:r>
+            <a:r>
+              <a:rPr lang="en-US" sz="2000" b="1" dirty="0" err="1" smtClean="0">
+                <a:solidFill>
+                  <a:schemeClr val="accent1"/>
+                </a:solidFill>
+              </a:rPr>
+              <a:t>dancer</a:t>
+            </a:r>
+            <a:endParaRPr lang="en-US" sz="2000" b="1" dirty="0" smtClean="0">
+              <a:solidFill>
+                <a:schemeClr val="accent1"/>
+              </a:solidFill>
+            </a:endParaRPr>
+          </a:p>
+          <a:p>
+            <a:pPr marL="400050" lvl="1" indent="0">
+              <a:buNone/>
+            </a:pPr>
+            <a:r>
+              <a:rPr lang="en-US" sz="2000" b="1" dirty="0" smtClean="0">
+                <a:solidFill>
+                  <a:srgbClr val="C00000"/>
+                </a:solidFill>
+              </a:rPr>
+              <a:t>, </a:t>
+            </a:r>
+            <a:r>
+              <a:rPr lang="en-US" sz="2000" b="1" dirty="0" err="1">
+                <a:solidFill>
+                  <a:srgbClr val="C00000"/>
+                </a:solidFill>
+              </a:rPr>
+              <a:t>SpecialSign</a:t>
+            </a:r>
+            <a:r>
+              <a:rPr lang="en-US" sz="2000" b="1" dirty="0">
+                <a:solidFill>
+                  <a:srgbClr val="C00000"/>
+                </a:solidFill>
+              </a:rPr>
+              <a:t> </a:t>
+            </a:r>
+            <a:r>
+              <a:rPr lang="en-US" sz="2000" b="1" dirty="0" err="1">
+                <a:solidFill>
+                  <a:srgbClr val="C00000"/>
+                </a:solidFill>
+              </a:rPr>
+              <a:t>specialSign</a:t>
+            </a:r>
+            <a:endParaRPr lang="en-US" sz="2000" b="1" dirty="0">
+              <a:solidFill>
+                <a:srgbClr val="C00000"/>
+              </a:solidFill>
+            </a:endParaRPr>
+          </a:p>
+          <a:p>
+            <a:pPr marL="400050" lvl="1" indent="0">
+              <a:buNone/>
+            </a:pPr>
+            <a:r>
+              <a:rPr lang="en-US" sz="2000" b="1" dirty="0">
+                <a:solidFill>
+                  <a:srgbClr val="7030A0"/>
+                </a:solidFill>
+              </a:rPr>
+              <a:t>, Garter </a:t>
+            </a:r>
+            <a:r>
+              <a:rPr lang="en-US" sz="2000" b="1" dirty="0" err="1">
+                <a:solidFill>
+                  <a:srgbClr val="7030A0"/>
+                </a:solidFill>
+              </a:rPr>
+              <a:t>garter</a:t>
+            </a:r>
+            <a:r>
+              <a:rPr lang="en-US" sz="2000" b="1" dirty="0">
+                <a:solidFill>
+                  <a:srgbClr val="7030A0"/>
+                </a:solidFill>
+              </a:rPr>
+              <a:t> </a:t>
+            </a:r>
+          </a:p>
+          <a:p>
+            <a:pPr marL="400050" lvl="1" indent="0">
+              <a:buNone/>
+            </a:pPr>
+            <a:r>
+              <a:rPr lang="en-US" sz="2000" b="1" dirty="0"/>
+              <a:t>WHERE </a:t>
+            </a:r>
+            <a:r>
+              <a:rPr lang="en-US" sz="2000" b="1" dirty="0" err="1"/>
+              <a:t>dancer.hairColor</a:t>
+            </a:r>
+            <a:r>
+              <a:rPr lang="en-US" sz="2000" b="1" dirty="0"/>
+              <a:t> = 'blond' </a:t>
+            </a:r>
+          </a:p>
+          <a:p>
+            <a:pPr marL="400050" lvl="1" indent="0">
+              <a:buNone/>
+            </a:pPr>
+            <a:r>
+              <a:rPr lang="en-US" sz="2000" b="1" dirty="0">
+                <a:solidFill>
+                  <a:srgbClr val="7030A0"/>
+                </a:solidFill>
+              </a:rPr>
+              <a:t>AND </a:t>
+            </a:r>
+            <a:r>
+              <a:rPr lang="en-US" sz="2000" b="1" dirty="0" err="1">
+                <a:solidFill>
+                  <a:srgbClr val="7030A0"/>
+                </a:solidFill>
+              </a:rPr>
+              <a:t>garter.color</a:t>
+            </a:r>
+            <a:r>
+              <a:rPr lang="en-US" sz="2000" b="1" dirty="0">
+                <a:solidFill>
+                  <a:srgbClr val="7030A0"/>
+                </a:solidFill>
+              </a:rPr>
+              <a:t> = ‘purple' </a:t>
+            </a:r>
+          </a:p>
+          <a:p>
+            <a:pPr marL="400050" lvl="1" indent="0">
+              <a:buNone/>
+            </a:pPr>
+            <a:r>
+              <a:rPr lang="en-US" sz="2000" b="1" dirty="0" smtClean="0">
+                <a:solidFill>
+                  <a:srgbClr val="C00000"/>
+                </a:solidFill>
+              </a:rPr>
+              <a:t>AND </a:t>
+            </a:r>
+            <a:r>
+              <a:rPr lang="en-US" sz="2000" b="1" dirty="0" err="1">
+                <a:solidFill>
+                  <a:srgbClr val="C00000"/>
+                </a:solidFill>
+              </a:rPr>
+              <a:t>specialSign.type</a:t>
+            </a:r>
+            <a:r>
+              <a:rPr lang="en-US" sz="2000" b="1" dirty="0">
+                <a:solidFill>
+                  <a:srgbClr val="C00000"/>
+                </a:solidFill>
+              </a:rPr>
+              <a:t> = '</a:t>
+            </a:r>
+            <a:r>
+              <a:rPr lang="en-US" sz="2000" b="1" dirty="0" err="1">
+                <a:solidFill>
+                  <a:srgbClr val="C00000"/>
+                </a:solidFill>
+              </a:rPr>
+              <a:t>beauty_spot</a:t>
+            </a:r>
+            <a:r>
+              <a:rPr lang="en-US" sz="2000" b="1" dirty="0">
+                <a:solidFill>
+                  <a:srgbClr val="C00000"/>
+                </a:solidFill>
+              </a:rPr>
+              <a:t>' </a:t>
+            </a:r>
+            <a:endParaRPr lang="en-US" sz="2000" b="1" dirty="0" smtClean="0">
+              <a:solidFill>
+                <a:srgbClr val="C00000"/>
+              </a:solidFill>
+            </a:endParaRPr>
+          </a:p>
+          <a:p>
+            <a:pPr marL="400050" lvl="1" indent="0">
+              <a:buNone/>
+            </a:pPr>
+            <a:r>
+              <a:rPr lang="en-US" sz="2000" b="1" dirty="0" smtClean="0">
+                <a:solidFill>
+                  <a:srgbClr val="C00000"/>
+                </a:solidFill>
+              </a:rPr>
+              <a:t>AND </a:t>
+            </a:r>
+            <a:r>
+              <a:rPr lang="en-US" sz="2000" b="1" dirty="0" err="1">
+                <a:solidFill>
+                  <a:srgbClr val="C00000"/>
+                </a:solidFill>
+              </a:rPr>
+              <a:t>specialSign.location</a:t>
+            </a:r>
+            <a:r>
+              <a:rPr lang="en-US" sz="2000" b="1" dirty="0">
+                <a:solidFill>
+                  <a:srgbClr val="C00000"/>
+                </a:solidFill>
+              </a:rPr>
+              <a:t> = 'cheek' </a:t>
+            </a:r>
+            <a:endParaRPr lang="en-US" sz="2000" b="1" dirty="0" smtClean="0">
+              <a:solidFill>
+                <a:srgbClr val="C00000"/>
+              </a:solidFill>
+            </a:endParaRPr>
+          </a:p>
+          <a:p>
+            <a:pPr marL="400050" lvl="1" indent="0">
+              <a:buNone/>
+            </a:pPr>
+            <a:r>
+              <a:rPr lang="en-US" sz="2000" b="1" dirty="0" smtClean="0">
+                <a:solidFill>
+                  <a:srgbClr val="C00000"/>
+                </a:solidFill>
+              </a:rPr>
+              <a:t>AND </a:t>
+            </a:r>
+            <a:r>
+              <a:rPr lang="en-US" sz="2000" b="1" dirty="0" err="1">
+                <a:solidFill>
+                  <a:srgbClr val="C00000"/>
+                </a:solidFill>
+              </a:rPr>
+              <a:t>specialSign.owner</a:t>
+            </a:r>
+            <a:r>
+              <a:rPr lang="en-US" sz="2000" b="1" dirty="0">
+                <a:solidFill>
+                  <a:srgbClr val="C00000"/>
+                </a:solidFill>
+              </a:rPr>
+              <a:t> = dancer.id </a:t>
+            </a:r>
+            <a:endParaRPr lang="en-US" sz="2000" b="1" dirty="0" smtClean="0">
+              <a:solidFill>
+                <a:srgbClr val="C00000"/>
+              </a:solidFill>
+            </a:endParaRPr>
+          </a:p>
+          <a:p>
+            <a:pPr marL="400050" lvl="1" indent="0">
+              <a:buNone/>
+            </a:pPr>
+            <a:r>
+              <a:rPr lang="en-US" sz="2000" b="1" dirty="0">
+                <a:solidFill>
+                  <a:srgbClr val="7030A0"/>
+                </a:solidFill>
+              </a:rPr>
+              <a:t>AND </a:t>
+            </a:r>
+            <a:r>
+              <a:rPr lang="en-US" sz="2000" b="1" dirty="0" err="1">
+                <a:solidFill>
+                  <a:srgbClr val="7030A0"/>
+                </a:solidFill>
+              </a:rPr>
+              <a:t>garter.owner</a:t>
+            </a:r>
+            <a:r>
+              <a:rPr lang="en-US" sz="2000" b="1" dirty="0">
+                <a:solidFill>
+                  <a:srgbClr val="7030A0"/>
+                </a:solidFill>
+              </a:rPr>
+              <a:t> = </a:t>
+            </a:r>
+            <a:r>
+              <a:rPr lang="en-US" sz="2000" b="1" dirty="0" smtClean="0">
+                <a:solidFill>
+                  <a:srgbClr val="7030A0"/>
+                </a:solidFill>
+              </a:rPr>
+              <a:t>dancer.id</a:t>
+            </a:r>
+            <a:endParaRPr lang="en-US" sz="2000" b="1" dirty="0">
+              <a:solidFill>
+                <a:srgbClr val="7030A0"/>
+              </a:solidFill>
+            </a:endParaRPr>
           </a:p>
         </p:txBody>
       </p:sp>
       <p:pic>
         <p:nvPicPr>
-          <p:cNvPr id="1026" name="Picture 2" descr="C:\Users\S243850\Pictures\dancer.png"/>
+          <p:cNvPr id="5" name="Picture 2" descr="C:\Users\S243850\Pictures\dancer.png"/>
           <p:cNvPicPr>
             <a:picLocks noChangeAspect="1" noChangeArrowheads="1"/>
           </p:cNvPicPr>
@@ -3331,8 +4280,8 @@
         </p:blipFill>
         <p:spPr bwMode="auto">
           <a:xfrm>
-            <a:off x="899592" y="2564904"/>
-            <a:ext cx="3413760" cy="1173480"/>
+            <a:off x="1331640" y="332636"/>
+            <a:ext cx="5120640" cy="1760220"/>
           </a:xfrm>
           <a:prstGeom prst="rect">
             <a:avLst/>
@@ -3351,40 +4300,57 @@
       </p:pic>
       <p:sp>
         <p:nvSpPr>
-          <p:cNvPr id="3" name="Espace réservé du contenu 2"/>
-          <p:cNvSpPr>
-            <a:spLocks noGrp="1"/>
-          </p:cNvSpPr>
-          <p:nvPr>
-            <p:ph idx="1"/>
-          </p:nvPr>
-        </p:nvSpPr>
-        <p:spPr/>
-        <p:txBody>
-          <a:bodyPr/>
-          <a:lstStyle/>
-          <a:p>
-            <a:endParaRPr lang="en-US" dirty="0"/>
+          <p:cNvPr id="7" name="Rectangle 6"/>
+          <p:cNvSpPr/>
+          <p:nvPr/>
+        </p:nvSpPr>
+        <p:spPr>
+          <a:xfrm>
+            <a:off x="802582" y="4509120"/>
+            <a:ext cx="914400" cy="457200"/>
+          </a:xfrm>
+          <a:prstGeom prst="rect">
+            <a:avLst/>
+          </a:prstGeom>
+          <a:solidFill>
+            <a:schemeClr val="tx1"/>
+          </a:solidFill>
+        </p:spPr>
+        <p:style>
+          <a:lnRef idx="2">
+            <a:schemeClr val="accent1">
+              <a:shade val="50000"/>
+            </a:schemeClr>
+          </a:lnRef>
+          <a:fillRef idx="1">
+            <a:schemeClr val="accent1"/>
+          </a:fillRef>
+          <a:effectRef idx="0">
+            <a:schemeClr val="accent1"/>
+          </a:effectRef>
+          <a:fontRef idx="minor">
+            <a:schemeClr val="lt1"/>
+          </a:fontRef>
+        </p:style>
+        <p:txBody>
+          <a:bodyPr rtlCol="0" anchor="ctr"/>
+          <a:lstStyle/>
+          <a:p>
+            <a:pPr algn="ctr"/>
+            <a:endParaRPr lang="en-US"/>
           </a:p>
         </p:txBody>
       </p:sp>
     </p:spTree>
     <p:extLst>
       <p:ext uri="{BB962C8B-B14F-4D97-AF65-F5344CB8AC3E}">
-        <p14:creationId xmlns:p14="http://schemas.microsoft.com/office/powerpoint/2010/main" val="3364463895"/>
+        <p14:creationId xmlns:p14="http://schemas.microsoft.com/office/powerpoint/2010/main" val="1926047793"/>
       </p:ext>
     </p:extLst>
   </p:cSld>
   <p:clrMapOvr>
     <a:masterClrMapping/>
   </p:clrMapOvr>
-  <p:timing>
-    <p:tnLst>
-      <p:par>
-        <p:cTn id="1" dur="indefinite" restart="never" nodeType="tmRoot"/>
-      </p:par>
-    </p:tnLst>
-  </p:timing>
 </p:sld>
 </file>
 

</xml_diff>

<commit_message>
doc(reason): why it is useful
reduces the complexity in translating the criteria in jpql
</commit_message>
<xml_diff>
--- a/Criteria Mix.pptx
+++ b/Criteria Mix.pptx
@@ -4,6 +4,9 @@
   <p:sldMasterIdLst>
     <p:sldMasterId id="2147483648" r:id="rId1"/>
   </p:sldMasterIdLst>
+  <p:notesMasterIdLst>
+    <p:notesMasterId r:id="rId17"/>
+  </p:notesMasterIdLst>
   <p:sldIdLst>
     <p:sldId id="256" r:id="rId2"/>
     <p:sldId id="258" r:id="rId3"/>
@@ -17,6 +20,9 @@
     <p:sldId id="264" r:id="rId11"/>
     <p:sldId id="275" r:id="rId12"/>
     <p:sldId id="276" r:id="rId13"/>
+    <p:sldId id="277" r:id="rId14"/>
+    <p:sldId id="278" r:id="rId15"/>
+    <p:sldId id="281" r:id="rId16"/>
   </p:sldIdLst>
   <p:sldSz cx="9144000" cy="6858000" type="screen4x3"/>
   <p:notesSz cx="6858000" cy="9144000"/>
@@ -116,6 +122,356 @@
     </a:lvl9pPr>
   </p:defaultTextStyle>
 </p:presentation>
+</file>
+
+<file path=ppt/notesMasters/notesMaster1.xml><?xml version="1.0" encoding="utf-8"?>
+<p:notesMaster xmlns:a="http://schemas.openxmlformats.org/drawingml/2006/main" xmlns:r="http://schemas.openxmlformats.org/officeDocument/2006/relationships" xmlns:p="http://schemas.openxmlformats.org/presentationml/2006/main">
+  <p:cSld>
+    <p:bg>
+      <p:bgRef idx="1001">
+        <a:schemeClr val="bg1"/>
+      </p:bgRef>
+    </p:bg>
+    <p:spTree>
+      <p:nvGrpSpPr>
+        <p:cNvPr id="1" name=""/>
+        <p:cNvGrpSpPr/>
+        <p:nvPr/>
+      </p:nvGrpSpPr>
+      <p:grpSpPr>
+        <a:xfrm>
+          <a:off x="0" y="0"/>
+          <a:ext cx="0" cy="0"/>
+          <a:chOff x="0" y="0"/>
+          <a:chExt cx="0" cy="0"/>
+        </a:xfrm>
+      </p:grpSpPr>
+      <p:sp>
+        <p:nvSpPr>
+          <p:cNvPr id="2" name="Espace réservé de l'en-tête 1"/>
+          <p:cNvSpPr>
+            <a:spLocks noGrp="1"/>
+          </p:cNvSpPr>
+          <p:nvPr>
+            <p:ph type="hdr" sz="quarter"/>
+          </p:nvPr>
+        </p:nvSpPr>
+        <p:spPr>
+          <a:xfrm>
+            <a:off x="0" y="0"/>
+            <a:ext cx="2971800" cy="457200"/>
+          </a:xfrm>
+          <a:prstGeom prst="rect">
+            <a:avLst/>
+          </a:prstGeom>
+        </p:spPr>
+        <p:txBody>
+          <a:bodyPr vert="horz" lIns="91440" tIns="45720" rIns="91440" bIns="45720" rtlCol="0"/>
+          <a:lstStyle>
+            <a:lvl1pPr algn="l">
+              <a:defRPr sz="1200"/>
+            </a:lvl1pPr>
+          </a:lstStyle>
+          <a:p>
+            <a:endParaRPr lang="en-US"/>
+          </a:p>
+        </p:txBody>
+      </p:sp>
+      <p:sp>
+        <p:nvSpPr>
+          <p:cNvPr id="3" name="Espace réservé de la date 2"/>
+          <p:cNvSpPr>
+            <a:spLocks noGrp="1"/>
+          </p:cNvSpPr>
+          <p:nvPr>
+            <p:ph type="dt" idx="1"/>
+          </p:nvPr>
+        </p:nvSpPr>
+        <p:spPr>
+          <a:xfrm>
+            <a:off x="3884613" y="0"/>
+            <a:ext cx="2971800" cy="457200"/>
+          </a:xfrm>
+          <a:prstGeom prst="rect">
+            <a:avLst/>
+          </a:prstGeom>
+        </p:spPr>
+        <p:txBody>
+          <a:bodyPr vert="horz" lIns="91440" tIns="45720" rIns="91440" bIns="45720" rtlCol="0"/>
+          <a:lstStyle>
+            <a:lvl1pPr algn="r">
+              <a:defRPr sz="1200"/>
+            </a:lvl1pPr>
+          </a:lstStyle>
+          <a:p>
+            <a:fld id="{7A7258A8-A15D-493D-8023-22A4A490716F}" type="datetimeFigureOut">
+              <a:rPr lang="en-US" smtClean="0"/>
+              <a:t>2/4/2016</a:t>
+            </a:fld>
+            <a:endParaRPr lang="en-US"/>
+          </a:p>
+        </p:txBody>
+      </p:sp>
+      <p:sp>
+        <p:nvSpPr>
+          <p:cNvPr id="4" name="Espace réservé de l'image des diapositives 3"/>
+          <p:cNvSpPr>
+            <a:spLocks noGrp="1" noRot="1" noChangeAspect="1"/>
+          </p:cNvSpPr>
+          <p:nvPr>
+            <p:ph type="sldImg" idx="2"/>
+          </p:nvPr>
+        </p:nvSpPr>
+        <p:spPr>
+          <a:xfrm>
+            <a:off x="1143000" y="685800"/>
+            <a:ext cx="4572000" cy="3429000"/>
+          </a:xfrm>
+          <a:prstGeom prst="rect">
+            <a:avLst/>
+          </a:prstGeom>
+          <a:noFill/>
+          <a:ln w="12700">
+            <a:solidFill>
+              <a:prstClr val="black"/>
+            </a:solidFill>
+          </a:ln>
+        </p:spPr>
+        <p:txBody>
+          <a:bodyPr vert="horz" lIns="91440" tIns="45720" rIns="91440" bIns="45720" rtlCol="0" anchor="ctr"/>
+          <a:lstStyle/>
+          <a:p>
+            <a:endParaRPr lang="en-US"/>
+          </a:p>
+        </p:txBody>
+      </p:sp>
+      <p:sp>
+        <p:nvSpPr>
+          <p:cNvPr id="5" name="Espace réservé des commentaires 4"/>
+          <p:cNvSpPr>
+            <a:spLocks noGrp="1"/>
+          </p:cNvSpPr>
+          <p:nvPr>
+            <p:ph type="body" sz="quarter" idx="3"/>
+          </p:nvPr>
+        </p:nvSpPr>
+        <p:spPr>
+          <a:xfrm>
+            <a:off x="685800" y="4343400"/>
+            <a:ext cx="5486400" cy="4114800"/>
+          </a:xfrm>
+          <a:prstGeom prst="rect">
+            <a:avLst/>
+          </a:prstGeom>
+        </p:spPr>
+        <p:txBody>
+          <a:bodyPr vert="horz" lIns="91440" tIns="45720" rIns="91440" bIns="45720" rtlCol="0"/>
+          <a:lstStyle/>
+          <a:p>
+            <a:pPr lvl="0"/>
+            <a:r>
+              <a:rPr lang="fr-FR" smtClean="0"/>
+              <a:t>Modifiez les styles du texte du masque</a:t>
+            </a:r>
+          </a:p>
+          <a:p>
+            <a:pPr lvl="1"/>
+            <a:r>
+              <a:rPr lang="fr-FR" smtClean="0"/>
+              <a:t>Deuxième niveau</a:t>
+            </a:r>
+          </a:p>
+          <a:p>
+            <a:pPr lvl="2"/>
+            <a:r>
+              <a:rPr lang="fr-FR" smtClean="0"/>
+              <a:t>Troisième niveau</a:t>
+            </a:r>
+          </a:p>
+          <a:p>
+            <a:pPr lvl="3"/>
+            <a:r>
+              <a:rPr lang="fr-FR" smtClean="0"/>
+              <a:t>Quatrième niveau</a:t>
+            </a:r>
+          </a:p>
+          <a:p>
+            <a:pPr lvl="4"/>
+            <a:r>
+              <a:rPr lang="fr-FR" smtClean="0"/>
+              <a:t>Cinquième niveau</a:t>
+            </a:r>
+            <a:endParaRPr lang="en-US"/>
+          </a:p>
+        </p:txBody>
+      </p:sp>
+      <p:sp>
+        <p:nvSpPr>
+          <p:cNvPr id="6" name="Espace réservé du pied de page 5"/>
+          <p:cNvSpPr>
+            <a:spLocks noGrp="1"/>
+          </p:cNvSpPr>
+          <p:nvPr>
+            <p:ph type="ftr" sz="quarter" idx="4"/>
+          </p:nvPr>
+        </p:nvSpPr>
+        <p:spPr>
+          <a:xfrm>
+            <a:off x="0" y="8685213"/>
+            <a:ext cx="2971800" cy="457200"/>
+          </a:xfrm>
+          <a:prstGeom prst="rect">
+            <a:avLst/>
+          </a:prstGeom>
+        </p:spPr>
+        <p:txBody>
+          <a:bodyPr vert="horz" lIns="91440" tIns="45720" rIns="91440" bIns="45720" rtlCol="0" anchor="b"/>
+          <a:lstStyle>
+            <a:lvl1pPr algn="l">
+              <a:defRPr sz="1200"/>
+            </a:lvl1pPr>
+          </a:lstStyle>
+          <a:p>
+            <a:endParaRPr lang="en-US"/>
+          </a:p>
+        </p:txBody>
+      </p:sp>
+      <p:sp>
+        <p:nvSpPr>
+          <p:cNvPr id="7" name="Espace réservé du numéro de diapositive 6"/>
+          <p:cNvSpPr>
+            <a:spLocks noGrp="1"/>
+          </p:cNvSpPr>
+          <p:nvPr>
+            <p:ph type="sldNum" sz="quarter" idx="5"/>
+          </p:nvPr>
+        </p:nvSpPr>
+        <p:spPr>
+          <a:xfrm>
+            <a:off x="3884613" y="8685213"/>
+            <a:ext cx="2971800" cy="457200"/>
+          </a:xfrm>
+          <a:prstGeom prst="rect">
+            <a:avLst/>
+          </a:prstGeom>
+        </p:spPr>
+        <p:txBody>
+          <a:bodyPr vert="horz" lIns="91440" tIns="45720" rIns="91440" bIns="45720" rtlCol="0" anchor="b"/>
+          <a:lstStyle>
+            <a:lvl1pPr algn="r">
+              <a:defRPr sz="1200"/>
+            </a:lvl1pPr>
+          </a:lstStyle>
+          <a:p>
+            <a:fld id="{7580BAF2-01D2-4D0F-9BE7-31D937BF9165}" type="slidenum">
+              <a:rPr lang="en-US" smtClean="0"/>
+              <a:t>‹N°›</a:t>
+            </a:fld>
+            <a:endParaRPr lang="en-US"/>
+          </a:p>
+        </p:txBody>
+      </p:sp>
+    </p:spTree>
+    <p:extLst>
+      <p:ext uri="{BB962C8B-B14F-4D97-AF65-F5344CB8AC3E}">
+        <p14:creationId xmlns:p14="http://schemas.microsoft.com/office/powerpoint/2010/main" val="2914677982"/>
+      </p:ext>
+    </p:extLst>
+  </p:cSld>
+  <p:clrMap bg1="lt1" tx1="dk1" bg2="lt2" tx2="dk2" accent1="accent1" accent2="accent2" accent3="accent3" accent4="accent4" accent5="accent5" accent6="accent6" hlink="hlink" folHlink="folHlink"/>
+  <p:notesStyle>
+    <a:lvl1pPr marL="0" algn="l" defTabSz="914400" rtl="0" eaLnBrk="1" latinLnBrk="0" hangingPunct="1">
+      <a:defRPr sz="1200" kern="1200">
+        <a:solidFill>
+          <a:schemeClr val="tx1"/>
+        </a:solidFill>
+        <a:latin typeface="+mn-lt"/>
+        <a:ea typeface="+mn-ea"/>
+        <a:cs typeface="+mn-cs"/>
+      </a:defRPr>
+    </a:lvl1pPr>
+    <a:lvl2pPr marL="457200" algn="l" defTabSz="914400" rtl="0" eaLnBrk="1" latinLnBrk="0" hangingPunct="1">
+      <a:defRPr sz="1200" kern="1200">
+        <a:solidFill>
+          <a:schemeClr val="tx1"/>
+        </a:solidFill>
+        <a:latin typeface="+mn-lt"/>
+        <a:ea typeface="+mn-ea"/>
+        <a:cs typeface="+mn-cs"/>
+      </a:defRPr>
+    </a:lvl2pPr>
+    <a:lvl3pPr marL="914400" algn="l" defTabSz="914400" rtl="0" eaLnBrk="1" latinLnBrk="0" hangingPunct="1">
+      <a:defRPr sz="1200" kern="1200">
+        <a:solidFill>
+          <a:schemeClr val="tx1"/>
+        </a:solidFill>
+        <a:latin typeface="+mn-lt"/>
+        <a:ea typeface="+mn-ea"/>
+        <a:cs typeface="+mn-cs"/>
+      </a:defRPr>
+    </a:lvl3pPr>
+    <a:lvl4pPr marL="1371600" algn="l" defTabSz="914400" rtl="0" eaLnBrk="1" latinLnBrk="0" hangingPunct="1">
+      <a:defRPr sz="1200" kern="1200">
+        <a:solidFill>
+          <a:schemeClr val="tx1"/>
+        </a:solidFill>
+        <a:latin typeface="+mn-lt"/>
+        <a:ea typeface="+mn-ea"/>
+        <a:cs typeface="+mn-cs"/>
+      </a:defRPr>
+    </a:lvl4pPr>
+    <a:lvl5pPr marL="1828800" algn="l" defTabSz="914400" rtl="0" eaLnBrk="1" latinLnBrk="0" hangingPunct="1">
+      <a:defRPr sz="1200" kern="1200">
+        <a:solidFill>
+          <a:schemeClr val="tx1"/>
+        </a:solidFill>
+        <a:latin typeface="+mn-lt"/>
+        <a:ea typeface="+mn-ea"/>
+        <a:cs typeface="+mn-cs"/>
+      </a:defRPr>
+    </a:lvl5pPr>
+    <a:lvl6pPr marL="2286000" algn="l" defTabSz="914400" rtl="0" eaLnBrk="1" latinLnBrk="0" hangingPunct="1">
+      <a:defRPr sz="1200" kern="1200">
+        <a:solidFill>
+          <a:schemeClr val="tx1"/>
+        </a:solidFill>
+        <a:latin typeface="+mn-lt"/>
+        <a:ea typeface="+mn-ea"/>
+        <a:cs typeface="+mn-cs"/>
+      </a:defRPr>
+    </a:lvl6pPr>
+    <a:lvl7pPr marL="2743200" algn="l" defTabSz="914400" rtl="0" eaLnBrk="1" latinLnBrk="0" hangingPunct="1">
+      <a:defRPr sz="1200" kern="1200">
+        <a:solidFill>
+          <a:schemeClr val="tx1"/>
+        </a:solidFill>
+        <a:latin typeface="+mn-lt"/>
+        <a:ea typeface="+mn-ea"/>
+        <a:cs typeface="+mn-cs"/>
+      </a:defRPr>
+    </a:lvl7pPr>
+    <a:lvl8pPr marL="3200400" algn="l" defTabSz="914400" rtl="0" eaLnBrk="1" latinLnBrk="0" hangingPunct="1">
+      <a:defRPr sz="1200" kern="1200">
+        <a:solidFill>
+          <a:schemeClr val="tx1"/>
+        </a:solidFill>
+        <a:latin typeface="+mn-lt"/>
+        <a:ea typeface="+mn-ea"/>
+        <a:cs typeface="+mn-cs"/>
+      </a:defRPr>
+    </a:lvl8pPr>
+    <a:lvl9pPr marL="3657600" algn="l" defTabSz="914400" rtl="0" eaLnBrk="1" latinLnBrk="0" hangingPunct="1">
+      <a:defRPr sz="1200" kern="1200">
+        <a:solidFill>
+          <a:schemeClr val="tx1"/>
+        </a:solidFill>
+        <a:latin typeface="+mn-lt"/>
+        <a:ea typeface="+mn-ea"/>
+        <a:cs typeface="+mn-cs"/>
+      </a:defRPr>
+    </a:lvl9pPr>
+  </p:notesStyle>
+</p:notesMaster>
 </file>
 
 <file path=ppt/slideLayouts/slideLayout1.xml><?xml version="1.0" encoding="utf-8"?>
@@ -3814,6 +4170,13 @@
   <p:clrMapOvr>
     <a:masterClrMapping/>
   </p:clrMapOvr>
+  <p:timing>
+    <p:tnLst>
+      <p:par>
+        <p:cTn id="1" dur="indefinite" restart="never" nodeType="tmRoot"/>
+      </p:par>
+    </p:tnLst>
+  </p:timing>
 </p:sld>
 </file>
 
@@ -4351,6 +4714,980 @@
   <p:clrMapOvr>
     <a:masterClrMapping/>
   </p:clrMapOvr>
+  <p:timing>
+    <p:tnLst>
+      <p:par>
+        <p:cTn id="1" dur="indefinite" restart="never" nodeType="tmRoot"/>
+      </p:par>
+    </p:tnLst>
+  </p:timing>
+</p:sld>
+</file>
+
+<file path=ppt/slides/slide13.xml><?xml version="1.0" encoding="utf-8"?>
+<p:sld xmlns:a="http://schemas.openxmlformats.org/drawingml/2006/main" xmlns:r="http://schemas.openxmlformats.org/officeDocument/2006/relationships" xmlns:p="http://schemas.openxmlformats.org/presentationml/2006/main">
+  <p:cSld>
+    <p:spTree>
+      <p:nvGrpSpPr>
+        <p:cNvPr id="1" name=""/>
+        <p:cNvGrpSpPr/>
+        <p:nvPr/>
+      </p:nvGrpSpPr>
+      <p:grpSpPr>
+        <a:xfrm>
+          <a:off x="0" y="0"/>
+          <a:ext cx="0" cy="0"/>
+          <a:chOff x="0" y="0"/>
+          <a:chExt cx="0" cy="0"/>
+        </a:xfrm>
+      </p:grpSpPr>
+      <p:sp>
+        <p:nvSpPr>
+          <p:cNvPr id="2" name="Titre 1"/>
+          <p:cNvSpPr>
+            <a:spLocks noGrp="1"/>
+          </p:cNvSpPr>
+          <p:nvPr>
+            <p:ph type="title"/>
+          </p:nvPr>
+        </p:nvSpPr>
+        <p:spPr/>
+        <p:txBody>
+          <a:bodyPr/>
+          <a:lstStyle/>
+          <a:p>
+            <a:r>
+              <a:rPr lang="fr-FR" dirty="0" smtClean="0"/>
+              <a:t>Réduire la complexité</a:t>
+            </a:r>
+            <a:endParaRPr lang="en-US" dirty="0"/>
+          </a:p>
+        </p:txBody>
+      </p:sp>
+      <p:sp>
+        <p:nvSpPr>
+          <p:cNvPr id="3" name="Espace réservé du contenu 2"/>
+          <p:cNvSpPr>
+            <a:spLocks noGrp="1"/>
+          </p:cNvSpPr>
+          <p:nvPr>
+            <p:ph idx="1"/>
+          </p:nvPr>
+        </p:nvSpPr>
+        <p:spPr/>
+        <p:txBody>
+          <a:bodyPr/>
+          <a:lstStyle/>
+          <a:p>
+            <a:r>
+              <a:rPr lang="fr-FR" dirty="0" smtClean="0"/>
+              <a:t>Pour un </a:t>
+            </a:r>
+            <a:r>
+              <a:rPr lang="fr-FR" dirty="0"/>
+              <a:t>seul panneau de </a:t>
+            </a:r>
+            <a:r>
+              <a:rPr lang="fr-FR" dirty="0" smtClean="0"/>
+              <a:t>sélection, le code destiné à produire de ces requêtes à partir des critères peut devenir un fameux plat de spaghetti. Notre projet avait des dizaines d’écrans de sélection.</a:t>
+            </a:r>
+          </a:p>
+          <a:p>
+            <a:endParaRPr lang="en-US" dirty="0"/>
+          </a:p>
+        </p:txBody>
+      </p:sp>
+      <p:pic>
+        <p:nvPicPr>
+          <p:cNvPr id="2050" name="Picture 2" descr="Il s’attache avec son plat de spaghetti"/>
+          <p:cNvPicPr>
+            <a:picLocks noChangeAspect="1" noChangeArrowheads="1"/>
+          </p:cNvPicPr>
+          <p:nvPr/>
+        </p:nvPicPr>
+        <p:blipFill>
+          <a:blip r:embed="rId2">
+            <a:extLst>
+              <a:ext uri="{28A0092B-C50C-407E-A947-70E740481C1C}">
+                <a14:useLocalDpi xmlns:a14="http://schemas.microsoft.com/office/drawing/2010/main" val="0"/>
+              </a:ext>
+            </a:extLst>
+          </a:blip>
+          <a:srcRect/>
+          <a:stretch>
+            <a:fillRect/>
+          </a:stretch>
+        </p:blipFill>
+        <p:spPr bwMode="auto">
+          <a:xfrm>
+            <a:off x="4932040" y="3573016"/>
+            <a:ext cx="3448050" cy="2667000"/>
+          </a:xfrm>
+          <a:prstGeom prst="rect">
+            <a:avLst/>
+          </a:prstGeom>
+          <a:noFill/>
+          <a:extLst>
+            <a:ext uri="{909E8E84-426E-40DD-AFC4-6F175D3DCCD1}">
+              <a14:hiddenFill xmlns:a14="http://schemas.microsoft.com/office/drawing/2010/main">
+                <a:solidFill>
+                  <a:srgbClr val="FFFFFF"/>
+                </a:solidFill>
+              </a14:hiddenFill>
+            </a:ext>
+          </a:extLst>
+        </p:spPr>
+      </p:pic>
+    </p:spTree>
+    <p:extLst>
+      <p:ext uri="{BB962C8B-B14F-4D97-AF65-F5344CB8AC3E}">
+        <p14:creationId xmlns:p14="http://schemas.microsoft.com/office/powerpoint/2010/main" val="3562909192"/>
+      </p:ext>
+    </p:extLst>
+  </p:cSld>
+  <p:clrMapOvr>
+    <a:masterClrMapping/>
+  </p:clrMapOvr>
+  <p:timing>
+    <p:tnLst>
+      <p:par>
+        <p:cTn id="1" dur="indefinite" restart="never" nodeType="tmRoot"/>
+      </p:par>
+    </p:tnLst>
+  </p:timing>
+</p:sld>
+</file>
+
+<file path=ppt/slides/slide14.xml><?xml version="1.0" encoding="utf-8"?>
+<p:sld xmlns:a="http://schemas.openxmlformats.org/drawingml/2006/main" xmlns:r="http://schemas.openxmlformats.org/officeDocument/2006/relationships" xmlns:p="http://schemas.openxmlformats.org/presentationml/2006/main">
+  <p:cSld>
+    <p:spTree>
+      <p:nvGrpSpPr>
+        <p:cNvPr id="1" name=""/>
+        <p:cNvGrpSpPr/>
+        <p:nvPr/>
+      </p:nvGrpSpPr>
+      <p:grpSpPr>
+        <a:xfrm>
+          <a:off x="0" y="0"/>
+          <a:ext cx="0" cy="0"/>
+          <a:chOff x="0" y="0"/>
+          <a:chExt cx="0" cy="0"/>
+        </a:xfrm>
+      </p:grpSpPr>
+      <p:sp>
+        <p:nvSpPr>
+          <p:cNvPr id="2" name="Titre 1"/>
+          <p:cNvSpPr>
+            <a:spLocks noGrp="1"/>
+          </p:cNvSpPr>
+          <p:nvPr>
+            <p:ph type="title"/>
+          </p:nvPr>
+        </p:nvSpPr>
+        <p:spPr/>
+        <p:txBody>
+          <a:bodyPr>
+            <a:normAutofit fontScale="90000"/>
+          </a:bodyPr>
+          <a:lstStyle/>
+          <a:p>
+            <a:r>
+              <a:rPr lang="fr-FR" dirty="0" smtClean="0"/>
+              <a:t>Solution pour tous les cas du panneau</a:t>
+            </a:r>
+            <a:endParaRPr lang="en-US" dirty="0"/>
+          </a:p>
+        </p:txBody>
+      </p:sp>
+      <p:sp>
+        <p:nvSpPr>
+          <p:cNvPr id="3" name="Espace réservé du contenu 2"/>
+          <p:cNvSpPr>
+            <a:spLocks noGrp="1"/>
+          </p:cNvSpPr>
+          <p:nvPr>
+            <p:ph idx="1"/>
+          </p:nvPr>
+        </p:nvSpPr>
+        <p:spPr/>
+        <p:txBody>
+          <a:bodyPr>
+            <a:normAutofit fontScale="85000" lnSpcReduction="20000"/>
+          </a:bodyPr>
+          <a:lstStyle/>
+          <a:p>
+            <a:pPr marL="0" indent="0">
+              <a:buNone/>
+            </a:pPr>
+            <a:r>
+              <a:rPr lang="en-US" sz="2000" dirty="0"/>
+              <a:t>DancersPathFinder.Factory </a:t>
+            </a:r>
+            <a:r>
+              <a:rPr lang="en-US" sz="2000" dirty="0" smtClean="0"/>
+              <a:t> factory </a:t>
+            </a:r>
+            <a:r>
+              <a:rPr lang="en-US" sz="2000" dirty="0"/>
+              <a:t>= new DancersPathFinder.Factory();</a:t>
+            </a:r>
+          </a:p>
+          <a:p>
+            <a:pPr marL="0" indent="0">
+              <a:buNone/>
+            </a:pPr>
+            <a:r>
+              <a:rPr lang="en-US" sz="2000" dirty="0"/>
+              <a:t>JpqlPrescriptionsTranslater </a:t>
+            </a:r>
+            <a:r>
+              <a:rPr lang="en-US" sz="2000" dirty="0" smtClean="0"/>
+              <a:t> translater </a:t>
+            </a:r>
+            <a:r>
+              <a:rPr lang="en-US" sz="2000" dirty="0"/>
+              <a:t>= new JpqlPrescriptionsTranslater(factory);</a:t>
+            </a:r>
+          </a:p>
+          <a:p>
+            <a:pPr marL="0" indent="0">
+              <a:buNone/>
+            </a:pPr>
+            <a:r>
+              <a:rPr lang="en-US" sz="2000" dirty="0" smtClean="0"/>
+              <a:t>String query	=  </a:t>
+            </a:r>
+            <a:r>
+              <a:rPr lang="en-US" sz="2000" dirty="0"/>
+              <a:t>"SELECT dancer.name FROM Dancer </a:t>
+            </a:r>
+            <a:r>
+              <a:rPr lang="en-US" sz="2000" dirty="0"/>
+              <a:t>dancer</a:t>
+            </a:r>
+            <a:r>
+              <a:rPr lang="en-US" sz="2000" dirty="0"/>
+              <a:t>" </a:t>
+            </a:r>
+          </a:p>
+          <a:p>
+            <a:pPr marL="0" indent="0">
+              <a:buNone/>
+            </a:pPr>
+            <a:r>
+              <a:rPr lang="en-US" sz="2000" dirty="0" smtClean="0"/>
+              <a:t>		+ translater.translate(prescriptions</a:t>
+            </a:r>
+            <a:r>
+              <a:rPr lang="en-US" sz="2000" dirty="0"/>
+              <a:t>, true);    </a:t>
+            </a:r>
+            <a:endParaRPr lang="en-US" sz="2000" dirty="0"/>
+          </a:p>
+          <a:p>
+            <a:pPr marL="0" indent="0">
+              <a:buNone/>
+            </a:pPr>
+            <a:r>
+              <a:rPr lang="fr-FR" sz="2000" dirty="0" smtClean="0"/>
+              <a:t>  AVEC</a:t>
+            </a:r>
+            <a:endParaRPr lang="fr-FR" sz="2000" dirty="0"/>
+          </a:p>
+          <a:p>
+            <a:pPr marL="0" indent="0">
+              <a:buNone/>
+            </a:pPr>
+            <a:r>
+              <a:rPr lang="fr-FR" sz="2000" dirty="0" smtClean="0"/>
+              <a:t> </a:t>
+            </a:r>
+            <a:r>
+              <a:rPr lang="en-US" sz="2000" b="1" dirty="0"/>
+              <a:t>public</a:t>
+            </a:r>
+            <a:r>
+              <a:rPr lang="en-US" sz="2000" dirty="0"/>
+              <a:t> </a:t>
+            </a:r>
+            <a:r>
+              <a:rPr lang="en-US" sz="2000" b="1" dirty="0" err="1"/>
+              <a:t>enum</a:t>
+            </a:r>
+            <a:r>
+              <a:rPr lang="en-US" sz="2000" dirty="0"/>
+              <a:t> </a:t>
+            </a:r>
+            <a:r>
+              <a:rPr lang="en-US" sz="2000" dirty="0" err="1"/>
+              <a:t>DancersPathFinder</a:t>
+            </a:r>
+            <a:r>
+              <a:rPr lang="en-US" sz="2000" dirty="0"/>
+              <a:t> </a:t>
+            </a:r>
+            <a:r>
+              <a:rPr lang="en-US" sz="2000" b="1" dirty="0"/>
+              <a:t>implements</a:t>
+            </a:r>
+            <a:r>
+              <a:rPr lang="en-US" sz="2000" dirty="0"/>
+              <a:t> </a:t>
+            </a:r>
+            <a:r>
+              <a:rPr lang="en-US" sz="2000" dirty="0" err="1"/>
+              <a:t>PathFinder</a:t>
+            </a:r>
+            <a:r>
+              <a:rPr lang="en-US" sz="2000" dirty="0"/>
+              <a:t> </a:t>
+            </a:r>
+            <a:r>
+              <a:rPr lang="en-US" sz="2000" dirty="0" smtClean="0"/>
+              <a:t>{</a:t>
+            </a:r>
+            <a:endParaRPr lang="en-US" sz="2000" dirty="0"/>
+          </a:p>
+          <a:p>
+            <a:pPr marL="0" indent="0">
+              <a:buNone/>
+            </a:pPr>
+            <a:r>
+              <a:rPr lang="en-US" sz="2000" dirty="0"/>
+              <a:t>  </a:t>
+            </a:r>
+            <a:r>
+              <a:rPr lang="en-US" sz="2000" b="1" i="1" dirty="0" err="1" smtClean="0"/>
+              <a:t>hair_color</a:t>
+            </a:r>
+            <a:r>
+              <a:rPr lang="en-US" sz="2000" b="1" i="1" dirty="0" smtClean="0"/>
+              <a:t>	</a:t>
+            </a:r>
+            <a:r>
+              <a:rPr lang="en-US" sz="2000" dirty="0" smtClean="0"/>
+              <a:t>("</a:t>
+            </a:r>
+            <a:r>
+              <a:rPr lang="en-US" sz="2000" dirty="0"/>
+              <a:t>dancer</a:t>
+            </a:r>
+            <a:r>
+              <a:rPr lang="en-US" sz="2000" dirty="0" smtClean="0"/>
+              <a:t>", </a:t>
+            </a:r>
+            <a:r>
+              <a:rPr lang="en-US" sz="2000" dirty="0"/>
+              <a:t>"</a:t>
+            </a:r>
+            <a:r>
+              <a:rPr lang="en-US" sz="2000" dirty="0" err="1"/>
+              <a:t>hairColor</a:t>
+            </a:r>
+            <a:r>
+              <a:rPr lang="en-US" sz="2000" dirty="0" smtClean="0"/>
+              <a:t>", </a:t>
+            </a:r>
+            <a:r>
+              <a:rPr lang="en-US" sz="2000" dirty="0"/>
+              <a:t>" </a:t>
+            </a:r>
+            <a:r>
+              <a:rPr lang="en-US" sz="2000" dirty="0" smtClean="0"/>
+              <a:t>“ , </a:t>
+            </a:r>
+            <a:r>
+              <a:rPr lang="en-US" sz="2000" dirty="0"/>
+              <a:t>" "),	</a:t>
+            </a:r>
+          </a:p>
+          <a:p>
+            <a:pPr marL="0" indent="0">
+              <a:buNone/>
+            </a:pPr>
+            <a:r>
+              <a:rPr lang="en-US" sz="2000" dirty="0"/>
+              <a:t>  </a:t>
+            </a:r>
+            <a:r>
+              <a:rPr lang="en-US" sz="2000" b="1" i="1" dirty="0" err="1"/>
+              <a:t>specialSign_type</a:t>
+            </a:r>
+            <a:r>
+              <a:rPr lang="en-US" sz="2000" dirty="0"/>
+              <a:t>	("</a:t>
+            </a:r>
+            <a:r>
+              <a:rPr lang="en-US" sz="2000" dirty="0" err="1"/>
+              <a:t>specialSign</a:t>
+            </a:r>
+            <a:r>
+              <a:rPr lang="en-US" sz="2000" dirty="0"/>
+              <a:t>", "type"</a:t>
+            </a:r>
+          </a:p>
+          <a:p>
+            <a:pPr marL="0" indent="0">
+              <a:buNone/>
+            </a:pPr>
+            <a:r>
+              <a:rPr lang="en-US" sz="2000" dirty="0" smtClean="0"/>
+              <a:t>		, </a:t>
+            </a:r>
+            <a:r>
+              <a:rPr lang="en-US" sz="2000" dirty="0"/>
+              <a:t>"</a:t>
+            </a:r>
+            <a:r>
+              <a:rPr lang="en-US" sz="2000" b="1" dirty="0">
+                <a:solidFill>
+                  <a:srgbClr val="C00000"/>
+                </a:solidFill>
+              </a:rPr>
+              <a:t>,</a:t>
+            </a:r>
+            <a:r>
+              <a:rPr lang="en-US" sz="2000" dirty="0"/>
+              <a:t> </a:t>
+            </a:r>
+            <a:r>
+              <a:rPr lang="en-US" sz="2000" b="1" dirty="0" err="1">
+                <a:solidFill>
+                  <a:srgbClr val="C00000"/>
+                </a:solidFill>
+              </a:rPr>
+              <a:t>SpecialSign</a:t>
+            </a:r>
+            <a:r>
+              <a:rPr lang="en-US" sz="2000" b="1" dirty="0">
+                <a:solidFill>
+                  <a:srgbClr val="C00000"/>
+                </a:solidFill>
+              </a:rPr>
+              <a:t> </a:t>
+            </a:r>
+            <a:r>
+              <a:rPr lang="en-US" sz="2000" b="1" dirty="0" err="1">
+                <a:solidFill>
+                  <a:srgbClr val="C00000"/>
+                </a:solidFill>
+              </a:rPr>
+              <a:t>specialSign</a:t>
+            </a:r>
+            <a:r>
+              <a:rPr lang="en-US" sz="2000" dirty="0"/>
+              <a:t>"</a:t>
+            </a:r>
+          </a:p>
+          <a:p>
+            <a:pPr marL="0" indent="0">
+              <a:buNone/>
+            </a:pPr>
+            <a:r>
+              <a:rPr lang="en-US" sz="2000" dirty="0" smtClean="0"/>
+              <a:t>		, </a:t>
+            </a:r>
+            <a:r>
+              <a:rPr lang="en-US" sz="2000" dirty="0"/>
+              <a:t>"</a:t>
+            </a:r>
+            <a:r>
+              <a:rPr lang="en-US" sz="2000" b="1" dirty="0">
+                <a:solidFill>
+                  <a:srgbClr val="C00000"/>
+                </a:solidFill>
+              </a:rPr>
+              <a:t> AND </a:t>
+            </a:r>
+            <a:r>
+              <a:rPr lang="en-US" sz="2000" b="1" dirty="0" err="1">
+                <a:solidFill>
+                  <a:srgbClr val="C00000"/>
+                </a:solidFill>
+              </a:rPr>
+              <a:t>specialSign.owner</a:t>
+            </a:r>
+            <a:r>
+              <a:rPr lang="en-US" sz="2000" b="1" dirty="0">
+                <a:solidFill>
+                  <a:srgbClr val="C00000"/>
+                </a:solidFill>
+              </a:rPr>
+              <a:t> = dancer.id</a:t>
+            </a:r>
+            <a:r>
+              <a:rPr lang="en-US" sz="2000" dirty="0"/>
+              <a:t>"),	</a:t>
+            </a:r>
+          </a:p>
+          <a:p>
+            <a:pPr marL="0" indent="0">
+              <a:buNone/>
+            </a:pPr>
+            <a:r>
+              <a:rPr lang="en-US" sz="2000" dirty="0"/>
+              <a:t>  </a:t>
+            </a:r>
+            <a:r>
+              <a:rPr lang="en-US" sz="2000" b="1" i="1" dirty="0" err="1"/>
+              <a:t>specialSign_location</a:t>
+            </a:r>
+            <a:r>
+              <a:rPr lang="en-US" sz="2000" dirty="0"/>
+              <a:t>("</a:t>
+            </a:r>
+            <a:r>
+              <a:rPr lang="en-US" sz="2000" dirty="0" err="1"/>
+              <a:t>specialSign</a:t>
+            </a:r>
+            <a:r>
+              <a:rPr lang="en-US" sz="2000" dirty="0"/>
+              <a:t>", "location"</a:t>
+            </a:r>
+          </a:p>
+          <a:p>
+            <a:pPr marL="0" indent="0">
+              <a:buNone/>
+            </a:pPr>
+            <a:r>
+              <a:rPr lang="en-US" sz="2000" dirty="0" smtClean="0"/>
+              <a:t>		, </a:t>
+            </a:r>
+            <a:r>
+              <a:rPr lang="en-US" sz="2000" b="1" dirty="0">
+                <a:solidFill>
+                  <a:srgbClr val="C00000"/>
+                </a:solidFill>
+              </a:rPr>
+              <a:t>", </a:t>
+            </a:r>
+            <a:r>
+              <a:rPr lang="en-US" sz="2000" b="1" dirty="0" err="1">
+                <a:solidFill>
+                  <a:srgbClr val="C00000"/>
+                </a:solidFill>
+              </a:rPr>
+              <a:t>SpecialSign</a:t>
+            </a:r>
+            <a:r>
+              <a:rPr lang="en-US" sz="2000" b="1" dirty="0">
+                <a:solidFill>
+                  <a:srgbClr val="C00000"/>
+                </a:solidFill>
+              </a:rPr>
+              <a:t> </a:t>
+            </a:r>
+            <a:r>
+              <a:rPr lang="en-US" sz="2000" b="1" dirty="0" err="1">
+                <a:solidFill>
+                  <a:srgbClr val="C00000"/>
+                </a:solidFill>
+              </a:rPr>
+              <a:t>specialSign</a:t>
+            </a:r>
+            <a:r>
+              <a:rPr lang="en-US" sz="2000" dirty="0"/>
+              <a:t>"</a:t>
+            </a:r>
+          </a:p>
+          <a:p>
+            <a:pPr marL="0" indent="0">
+              <a:buNone/>
+            </a:pPr>
+            <a:r>
+              <a:rPr lang="en-US" sz="2000" dirty="0"/>
+              <a:t>		, "</a:t>
+            </a:r>
+            <a:r>
+              <a:rPr lang="en-US" sz="2000" b="1" dirty="0">
+                <a:solidFill>
+                  <a:srgbClr val="C00000"/>
+                </a:solidFill>
+              </a:rPr>
+              <a:t> AND </a:t>
+            </a:r>
+            <a:r>
+              <a:rPr lang="en-US" sz="2000" b="1" dirty="0" err="1">
+                <a:solidFill>
+                  <a:srgbClr val="C00000"/>
+                </a:solidFill>
+              </a:rPr>
+              <a:t>specialSign.owner</a:t>
+            </a:r>
+            <a:r>
+              <a:rPr lang="en-US" sz="2000" b="1" dirty="0">
+                <a:solidFill>
+                  <a:srgbClr val="C00000"/>
+                </a:solidFill>
+              </a:rPr>
+              <a:t> = dancer.id</a:t>
+            </a:r>
+            <a:r>
+              <a:rPr lang="en-US" sz="2000" dirty="0"/>
+              <a:t>"),	</a:t>
+            </a:r>
+          </a:p>
+          <a:p>
+            <a:pPr marL="0" indent="0">
+              <a:buNone/>
+            </a:pPr>
+            <a:r>
+              <a:rPr lang="en-US" sz="2000" dirty="0" smtClean="0"/>
+              <a:t>  </a:t>
+            </a:r>
+            <a:r>
+              <a:rPr lang="en-US" sz="2000" b="1" i="1" dirty="0" err="1"/>
+              <a:t>garter_color</a:t>
+            </a:r>
+            <a:r>
+              <a:rPr lang="en-US" sz="2000" dirty="0"/>
+              <a:t>	("garter", "color"	</a:t>
+            </a:r>
+          </a:p>
+          <a:p>
+            <a:pPr marL="0" indent="0">
+              <a:buNone/>
+            </a:pPr>
+            <a:r>
+              <a:rPr lang="en-US" sz="2000" dirty="0" smtClean="0"/>
+              <a:t>		, </a:t>
+            </a:r>
+            <a:r>
+              <a:rPr lang="en-US" sz="2000" dirty="0"/>
+              <a:t>"</a:t>
+            </a:r>
+            <a:r>
+              <a:rPr lang="en-US" sz="2000" b="1" dirty="0">
+                <a:solidFill>
+                  <a:srgbClr val="7030A0"/>
+                </a:solidFill>
+              </a:rPr>
+              <a:t>, Garter </a:t>
+            </a:r>
+            <a:r>
+              <a:rPr lang="en-US" sz="2000" b="1" dirty="0" err="1">
+                <a:solidFill>
+                  <a:srgbClr val="7030A0"/>
+                </a:solidFill>
+              </a:rPr>
+              <a:t>garter</a:t>
+            </a:r>
+            <a:r>
+              <a:rPr lang="en-US" sz="2000" dirty="0"/>
+              <a:t>"</a:t>
+            </a:r>
+          </a:p>
+          <a:p>
+            <a:pPr marL="0" lvl="1" indent="0">
+              <a:buNone/>
+            </a:pPr>
+            <a:r>
+              <a:rPr lang="en-US" sz="2000" dirty="0" smtClean="0"/>
+              <a:t>		, </a:t>
+            </a:r>
+            <a:r>
+              <a:rPr lang="en-US" sz="2000" dirty="0"/>
+              <a:t>" </a:t>
+            </a:r>
+            <a:r>
+              <a:rPr lang="en-US" sz="2000" b="1" dirty="0">
+                <a:solidFill>
+                  <a:srgbClr val="7030A0"/>
+                </a:solidFill>
+              </a:rPr>
+              <a:t>AND </a:t>
+            </a:r>
+            <a:r>
+              <a:rPr lang="en-US" sz="2000" b="1" dirty="0" err="1">
+                <a:solidFill>
+                  <a:srgbClr val="7030A0"/>
+                </a:solidFill>
+              </a:rPr>
+              <a:t>garter.owner</a:t>
+            </a:r>
+            <a:r>
+              <a:rPr lang="en-US" sz="2000" b="1" dirty="0">
+                <a:solidFill>
+                  <a:srgbClr val="7030A0"/>
+                </a:solidFill>
+              </a:rPr>
+              <a:t> = </a:t>
+            </a:r>
+            <a:r>
+              <a:rPr lang="en-US" sz="2000" b="1" dirty="0" smtClean="0">
+                <a:solidFill>
+                  <a:srgbClr val="7030A0"/>
+                </a:solidFill>
+              </a:rPr>
+              <a:t>dancer.id</a:t>
+            </a:r>
+            <a:r>
+              <a:rPr lang="en-US" sz="2000" dirty="0" smtClean="0"/>
+              <a:t>");</a:t>
+            </a:r>
+            <a:r>
+              <a:rPr lang="en-US" sz="2000" dirty="0"/>
+              <a:t>	</a:t>
+            </a:r>
+          </a:p>
+          <a:p>
+            <a:pPr marL="0" indent="0">
+              <a:buNone/>
+            </a:pPr>
+            <a:r>
+              <a:rPr lang="fr-FR" sz="2000" dirty="0" smtClean="0"/>
+              <a:t>… }</a:t>
+            </a:r>
+            <a:endParaRPr lang="en-US" sz="2000" dirty="0"/>
+          </a:p>
+        </p:txBody>
+      </p:sp>
+    </p:spTree>
+    <p:extLst>
+      <p:ext uri="{BB962C8B-B14F-4D97-AF65-F5344CB8AC3E}">
+        <p14:creationId xmlns:p14="http://schemas.microsoft.com/office/powerpoint/2010/main" val="1199013701"/>
+      </p:ext>
+    </p:extLst>
+  </p:cSld>
+  <p:clrMapOvr>
+    <a:masterClrMapping/>
+  </p:clrMapOvr>
+  <p:timing>
+    <p:tnLst>
+      <p:par>
+        <p:cTn id="1" dur="indefinite" restart="never" nodeType="tmRoot"/>
+      </p:par>
+    </p:tnLst>
+  </p:timing>
+</p:sld>
+</file>
+
+<file path=ppt/slides/slide15.xml><?xml version="1.0" encoding="utf-8"?>
+<p:sld xmlns:a="http://schemas.openxmlformats.org/drawingml/2006/main" xmlns:r="http://schemas.openxmlformats.org/officeDocument/2006/relationships" xmlns:p="http://schemas.openxmlformats.org/presentationml/2006/main">
+  <p:cSld>
+    <p:spTree>
+      <p:nvGrpSpPr>
+        <p:cNvPr id="1" name=""/>
+        <p:cNvGrpSpPr/>
+        <p:nvPr/>
+      </p:nvGrpSpPr>
+      <p:grpSpPr>
+        <a:xfrm>
+          <a:off x="0" y="0"/>
+          <a:ext cx="0" cy="0"/>
+          <a:chOff x="0" y="0"/>
+          <a:chExt cx="0" cy="0"/>
+        </a:xfrm>
+      </p:grpSpPr>
+      <p:sp>
+        <p:nvSpPr>
+          <p:cNvPr id="2" name="Titre 1"/>
+          <p:cNvSpPr>
+            <a:spLocks noGrp="1"/>
+          </p:cNvSpPr>
+          <p:nvPr>
+            <p:ph type="title"/>
+          </p:nvPr>
+        </p:nvSpPr>
+        <p:spPr/>
+        <p:txBody>
+          <a:bodyPr>
+            <a:normAutofit/>
+          </a:bodyPr>
+          <a:lstStyle/>
+          <a:p>
+            <a:pPr algn="ctr"/>
+            <a:r>
+              <a:rPr lang="fr-FR" sz="3600" dirty="0" smtClean="0"/>
+              <a:t>Conclusion</a:t>
+            </a:r>
+            <a:r>
+              <a:rPr lang="fr-FR" dirty="0"/>
+              <a:t/>
+            </a:r>
+            <a:br>
+              <a:rPr lang="fr-FR" dirty="0"/>
+            </a:br>
+            <a:endParaRPr lang="en-US" dirty="0"/>
+          </a:p>
+        </p:txBody>
+      </p:sp>
+      <p:sp>
+        <p:nvSpPr>
+          <p:cNvPr id="3" name="Espace réservé du contenu 2"/>
+          <p:cNvSpPr>
+            <a:spLocks noGrp="1"/>
+          </p:cNvSpPr>
+          <p:nvPr>
+            <p:ph idx="1"/>
+          </p:nvPr>
+        </p:nvSpPr>
+        <p:spPr/>
+        <p:txBody>
+          <a:bodyPr>
+            <a:normAutofit/>
+          </a:bodyPr>
+          <a:lstStyle/>
+          <a:p>
+            <a:pPr marL="0" indent="0">
+              <a:buNone/>
+            </a:pPr>
+            <a:r>
+              <a:rPr lang="fr-FR" sz="2400" dirty="0">
+                <a:hlinkClick r:id="rId2"/>
+              </a:rPr>
+              <a:t>https://</a:t>
+            </a:r>
+            <a:r>
+              <a:rPr lang="fr-FR" sz="2400" dirty="0" smtClean="0">
+                <a:hlinkClick r:id="rId2"/>
+              </a:rPr>
+              <a:t>github.com/olivier-coussieu</a:t>
+            </a:r>
+            <a:endParaRPr lang="fr-FR" sz="2400" dirty="0" smtClean="0"/>
+          </a:p>
+          <a:p>
+            <a:pPr marL="0" indent="0">
+              <a:buNone/>
+            </a:pPr>
+            <a:r>
+              <a:rPr lang="fr-FR" sz="2400" dirty="0" smtClean="0"/>
+              <a:t>Vous </a:t>
+            </a:r>
+            <a:r>
+              <a:rPr lang="fr-FR" sz="2400" dirty="0"/>
+              <a:t>trouverez les sources dans </a:t>
+            </a:r>
+          </a:p>
+          <a:p>
+            <a:pPr marL="0" indent="0">
+              <a:buNone/>
+            </a:pPr>
+            <a:r>
+              <a:rPr lang="fr-FR" sz="2400" dirty="0" err="1"/>
+              <a:t>aqueryum</a:t>
+            </a:r>
+            <a:r>
+              <a:rPr lang="fr-FR" sz="2400" dirty="0"/>
+              <a:t> et </a:t>
+            </a:r>
+            <a:r>
+              <a:rPr lang="fr-FR" sz="2400" dirty="0" err="1" smtClean="0"/>
+              <a:t>aqueryum</a:t>
+            </a:r>
+            <a:r>
+              <a:rPr lang="fr-FR" sz="2400" dirty="0" smtClean="0"/>
+              <a:t>-show-</a:t>
+            </a:r>
+            <a:r>
+              <a:rPr lang="fr-FR" sz="2400" dirty="0" err="1" smtClean="0"/>
+              <a:t>query</a:t>
+            </a:r>
+            <a:endParaRPr lang="fr-FR" sz="2400" dirty="0"/>
+          </a:p>
+          <a:p>
+            <a:pPr marL="0" indent="0">
+              <a:buNone/>
+            </a:pPr>
+            <a:endParaRPr lang="en-US" sz="2400" dirty="0"/>
+          </a:p>
+        </p:txBody>
+      </p:sp>
+      <p:sp>
+        <p:nvSpPr>
+          <p:cNvPr id="4" name="Espace réservé du texte 3"/>
+          <p:cNvSpPr>
+            <a:spLocks noGrp="1"/>
+          </p:cNvSpPr>
+          <p:nvPr>
+            <p:ph type="body" sz="half" idx="2"/>
+          </p:nvPr>
+        </p:nvSpPr>
+        <p:spPr/>
+        <p:txBody>
+          <a:bodyPr/>
+          <a:lstStyle/>
+          <a:p>
+            <a:r>
+              <a:rPr lang="fr-FR" dirty="0" smtClean="0"/>
+              <a:t>Je rédigerai une doc plus détaillée si quelqu’un me le demande.</a:t>
+            </a:r>
+            <a:endParaRPr lang="en-US" dirty="0"/>
+          </a:p>
+        </p:txBody>
+      </p:sp>
+      <p:pic>
+        <p:nvPicPr>
+          <p:cNvPr id="5122" name="Picture 2"/>
+          <p:cNvPicPr>
+            <a:picLocks noChangeAspect="1" noChangeArrowheads="1"/>
+          </p:cNvPicPr>
+          <p:nvPr/>
+        </p:nvPicPr>
+        <p:blipFill>
+          <a:blip r:embed="rId3">
+            <a:extLst>
+              <a:ext uri="{28A0092B-C50C-407E-A947-70E740481C1C}">
+                <a14:useLocalDpi xmlns:a14="http://schemas.microsoft.com/office/drawing/2010/main" val="0"/>
+              </a:ext>
+            </a:extLst>
+          </a:blip>
+          <a:srcRect/>
+          <a:stretch>
+            <a:fillRect/>
+          </a:stretch>
+        </p:blipFill>
+        <p:spPr bwMode="auto">
+          <a:xfrm>
+            <a:off x="2339752" y="2204864"/>
+            <a:ext cx="6486525" cy="4362450"/>
+          </a:xfrm>
+          <a:prstGeom prst="rect">
+            <a:avLst/>
+          </a:prstGeom>
+          <a:noFill/>
+          <a:ln>
+            <a:noFill/>
+          </a:ln>
+          <a:extLst>
+            <a:ext uri="{909E8E84-426E-40DD-AFC4-6F175D3DCCD1}">
+              <a14:hiddenFill xmlns:a14="http://schemas.microsoft.com/office/drawing/2010/main">
+                <a:solidFill>
+                  <a:schemeClr val="accent1"/>
+                </a:solidFill>
+              </a14:hiddenFill>
+            </a:ext>
+            <a:ext uri="{91240B29-F687-4F45-9708-019B960494DF}">
+              <a14:hiddenLine xmlns:a14="http://schemas.microsoft.com/office/drawing/2010/main" w="9525">
+                <a:solidFill>
+                  <a:schemeClr val="tx1"/>
+                </a:solidFill>
+                <a:miter lim="800000"/>
+                <a:headEnd/>
+                <a:tailEnd/>
+              </a14:hiddenLine>
+            </a:ext>
+          </a:extLst>
+        </p:spPr>
+      </p:pic>
+    </p:spTree>
+    <p:extLst>
+      <p:ext uri="{BB962C8B-B14F-4D97-AF65-F5344CB8AC3E}">
+        <p14:creationId xmlns:p14="http://schemas.microsoft.com/office/powerpoint/2010/main" val="1768480278"/>
+      </p:ext>
+    </p:extLst>
+  </p:cSld>
+  <p:clrMapOvr>
+    <a:masterClrMapping/>
+  </p:clrMapOvr>
+  <p:timing>
+    <p:tnLst>
+      <p:par>
+        <p:cTn id="1" dur="indefinite" restart="never" nodeType="tmRoot"/>
+      </p:par>
+    </p:tnLst>
+  </p:timing>
 </p:sld>
 </file>
 
@@ -4990,6 +6327,13 @@
   <p:clrMapOvr>
     <a:masterClrMapping/>
   </p:clrMapOvr>
+  <p:timing>
+    <p:tnLst>
+      <p:par>
+        <p:cTn id="1" dur="indefinite" restart="never" nodeType="tmRoot"/>
+      </p:par>
+    </p:tnLst>
+  </p:timing>
 </p:sld>
 </file>
 
@@ -5786,6 +7130,13 @@
   <p:clrMapOvr>
     <a:masterClrMapping/>
   </p:clrMapOvr>
+  <p:timing>
+    <p:tnLst>
+      <p:par>
+        <p:cTn id="1" dur="indefinite" restart="never" nodeType="tmRoot"/>
+      </p:par>
+    </p:tnLst>
+  </p:timing>
 </p:sld>
 </file>
 
@@ -5950,6 +7301,13 @@
   <p:clrMapOvr>
     <a:masterClrMapping/>
   </p:clrMapOvr>
+  <p:timing>
+    <p:tnLst>
+      <p:par>
+        <p:cTn id="1" dur="indefinite" restart="never" nodeType="tmRoot"/>
+      </p:par>
+    </p:tnLst>
+  </p:timing>
 </p:sld>
 </file>
 
@@ -6881,4 +8239,289 @@
   <a:objectDefaults/>
   <a:extraClrSchemeLst/>
 </a:theme>
+</file>
+
+<file path=ppt/theme/theme2.xml><?xml version="1.0" encoding="utf-8"?>
+<a:theme xmlns:a="http://schemas.openxmlformats.org/drawingml/2006/main" name="Thème Office">
+  <a:themeElements>
+    <a:clrScheme name="Office">
+      <a:dk1>
+        <a:sysClr val="windowText" lastClr="000000"/>
+      </a:dk1>
+      <a:lt1>
+        <a:sysClr val="window" lastClr="FFFFFF"/>
+      </a:lt1>
+      <a:dk2>
+        <a:srgbClr val="1F497D"/>
+      </a:dk2>
+      <a:lt2>
+        <a:srgbClr val="EEECE1"/>
+      </a:lt2>
+      <a:accent1>
+        <a:srgbClr val="4F81BD"/>
+      </a:accent1>
+      <a:accent2>
+        <a:srgbClr val="C0504D"/>
+      </a:accent2>
+      <a:accent3>
+        <a:srgbClr val="9BBB59"/>
+      </a:accent3>
+      <a:accent4>
+        <a:srgbClr val="8064A2"/>
+      </a:accent4>
+      <a:accent5>
+        <a:srgbClr val="4BACC6"/>
+      </a:accent5>
+      <a:accent6>
+        <a:srgbClr val="F79646"/>
+      </a:accent6>
+      <a:hlink>
+        <a:srgbClr val="0000FF"/>
+      </a:hlink>
+      <a:folHlink>
+        <a:srgbClr val="800080"/>
+      </a:folHlink>
+    </a:clrScheme>
+    <a:fontScheme name="Office">
+      <a:majorFont>
+        <a:latin typeface="Calibri"/>
+        <a:ea typeface=""/>
+        <a:cs typeface=""/>
+        <a:font script="Jpan" typeface="ＭＳ Ｐゴシック"/>
+        <a:font script="Hang" typeface="맑은 고딕"/>
+        <a:font script="Hans" typeface="宋体"/>
+        <a:font script="Hant" typeface="新細明體"/>
+        <a:font script="Arab" typeface="Times New Roman"/>
+        <a:font script="Hebr" typeface="Times New Roman"/>
+        <a:font script="Thai" typeface="Angsana New"/>
+        <a:font script="Ethi" typeface="Nyala"/>
+        <a:font script="Beng" typeface="Vrinda"/>
+        <a:font script="Gujr" typeface="Shruti"/>
+        <a:font script="Khmr" typeface="MoolBoran"/>
+        <a:font script="Knda" typeface="Tunga"/>
+        <a:font script="Guru" typeface="Raavi"/>
+        <a:font script="Cans" typeface="Euphemia"/>
+        <a:font script="Cher" typeface="Plantagenet Cherokee"/>
+        <a:font script="Yiii" typeface="Microsoft Yi Baiti"/>
+        <a:font script="Tibt" typeface="Microsoft Himalaya"/>
+        <a:font script="Thaa" typeface="MV Boli"/>
+        <a:font script="Deva" typeface="Mangal"/>
+        <a:font script="Telu" typeface="Gautami"/>
+        <a:font script="Taml" typeface="Latha"/>
+        <a:font script="Syrc" typeface="Estrangelo Edessa"/>
+        <a:font script="Orya" typeface="Kalinga"/>
+        <a:font script="Mlym" typeface="Kartika"/>
+        <a:font script="Laoo" typeface="DokChampa"/>
+        <a:font script="Sinh" typeface="Iskoola Pota"/>
+        <a:font script="Mong" typeface="Mongolian Baiti"/>
+        <a:font script="Viet" typeface="Times New Roman"/>
+        <a:font script="Uigh" typeface="Microsoft Uighur"/>
+        <a:font script="Geor" typeface="Sylfaen"/>
+      </a:majorFont>
+      <a:minorFont>
+        <a:latin typeface="Calibri"/>
+        <a:ea typeface=""/>
+        <a:cs typeface=""/>
+        <a:font script="Jpan" typeface="ＭＳ Ｐゴシック"/>
+        <a:font script="Hang" typeface="맑은 고딕"/>
+        <a:font script="Hans" typeface="宋体"/>
+        <a:font script="Hant" typeface="新細明體"/>
+        <a:font script="Arab" typeface="Arial"/>
+        <a:font script="Hebr" typeface="Arial"/>
+        <a:font script="Thai" typeface="Cordia New"/>
+        <a:font script="Ethi" typeface="Nyala"/>
+        <a:font script="Beng" typeface="Vrinda"/>
+        <a:font script="Gujr" typeface="Shruti"/>
+        <a:font script="Khmr" typeface="DaunPenh"/>
+        <a:font script="Knda" typeface="Tunga"/>
+        <a:font script="Guru" typeface="Raavi"/>
+        <a:font script="Cans" typeface="Euphemia"/>
+        <a:font script="Cher" typeface="Plantagenet Cherokee"/>
+        <a:font script="Yiii" typeface="Microsoft Yi Baiti"/>
+        <a:font script="Tibt" typeface="Microsoft Himalaya"/>
+        <a:font script="Thaa" typeface="MV Boli"/>
+        <a:font script="Deva" typeface="Mangal"/>
+        <a:font script="Telu" typeface="Gautami"/>
+        <a:font script="Taml" typeface="Latha"/>
+        <a:font script="Syrc" typeface="Estrangelo Edessa"/>
+        <a:font script="Orya" typeface="Kalinga"/>
+        <a:font script="Mlym" typeface="Kartika"/>
+        <a:font script="Laoo" typeface="DokChampa"/>
+        <a:font script="Sinh" typeface="Iskoola Pota"/>
+        <a:font script="Mong" typeface="Mongolian Baiti"/>
+        <a:font script="Viet" typeface="Arial"/>
+        <a:font script="Uigh" typeface="Microsoft Uighur"/>
+        <a:font script="Geor" typeface="Sylfaen"/>
+      </a:minorFont>
+    </a:fontScheme>
+    <a:fmtScheme name="Office">
+      <a:fillStyleLst>
+        <a:solidFill>
+          <a:schemeClr val="phClr"/>
+        </a:solidFill>
+        <a:gradFill rotWithShape="1">
+          <a:gsLst>
+            <a:gs pos="0">
+              <a:schemeClr val="phClr">
+                <a:tint val="50000"/>
+                <a:satMod val="300000"/>
+              </a:schemeClr>
+            </a:gs>
+            <a:gs pos="35000">
+              <a:schemeClr val="phClr">
+                <a:tint val="37000"/>
+                <a:satMod val="300000"/>
+              </a:schemeClr>
+            </a:gs>
+            <a:gs pos="100000">
+              <a:schemeClr val="phClr">
+                <a:tint val="15000"/>
+                <a:satMod val="350000"/>
+              </a:schemeClr>
+            </a:gs>
+          </a:gsLst>
+          <a:lin ang="16200000" scaled="1"/>
+        </a:gradFill>
+        <a:gradFill rotWithShape="1">
+          <a:gsLst>
+            <a:gs pos="0">
+              <a:schemeClr val="phClr">
+                <a:shade val="51000"/>
+                <a:satMod val="130000"/>
+              </a:schemeClr>
+            </a:gs>
+            <a:gs pos="80000">
+              <a:schemeClr val="phClr">
+                <a:shade val="93000"/>
+                <a:satMod val="130000"/>
+              </a:schemeClr>
+            </a:gs>
+            <a:gs pos="100000">
+              <a:schemeClr val="phClr">
+                <a:shade val="94000"/>
+                <a:satMod val="135000"/>
+              </a:schemeClr>
+            </a:gs>
+          </a:gsLst>
+          <a:lin ang="16200000" scaled="0"/>
+        </a:gradFill>
+      </a:fillStyleLst>
+      <a:lnStyleLst>
+        <a:ln w="9525" cap="flat" cmpd="sng" algn="ctr">
+          <a:solidFill>
+            <a:schemeClr val="phClr">
+              <a:shade val="95000"/>
+              <a:satMod val="105000"/>
+            </a:schemeClr>
+          </a:solidFill>
+          <a:prstDash val="solid"/>
+        </a:ln>
+        <a:ln w="25400" cap="flat" cmpd="sng" algn="ctr">
+          <a:solidFill>
+            <a:schemeClr val="phClr"/>
+          </a:solidFill>
+          <a:prstDash val="solid"/>
+        </a:ln>
+        <a:ln w="38100" cap="flat" cmpd="sng" algn="ctr">
+          <a:solidFill>
+            <a:schemeClr val="phClr"/>
+          </a:solidFill>
+          <a:prstDash val="solid"/>
+        </a:ln>
+      </a:lnStyleLst>
+      <a:effectStyleLst>
+        <a:effectStyle>
+          <a:effectLst>
+            <a:outerShdw blurRad="40000" dist="20000" dir="5400000" rotWithShape="0">
+              <a:srgbClr val="000000">
+                <a:alpha val="38000"/>
+              </a:srgbClr>
+            </a:outerShdw>
+          </a:effectLst>
+        </a:effectStyle>
+        <a:effectStyle>
+          <a:effectLst>
+            <a:outerShdw blurRad="40000" dist="23000" dir="5400000" rotWithShape="0">
+              <a:srgbClr val="000000">
+                <a:alpha val="35000"/>
+              </a:srgbClr>
+            </a:outerShdw>
+          </a:effectLst>
+        </a:effectStyle>
+        <a:effectStyle>
+          <a:effectLst>
+            <a:outerShdw blurRad="40000" dist="23000" dir="5400000" rotWithShape="0">
+              <a:srgbClr val="000000">
+                <a:alpha val="35000"/>
+              </a:srgbClr>
+            </a:outerShdw>
+          </a:effectLst>
+          <a:scene3d>
+            <a:camera prst="orthographicFront">
+              <a:rot lat="0" lon="0" rev="0"/>
+            </a:camera>
+            <a:lightRig rig="threePt" dir="t">
+              <a:rot lat="0" lon="0" rev="1200000"/>
+            </a:lightRig>
+          </a:scene3d>
+          <a:sp3d>
+            <a:bevelT w="63500" h="25400"/>
+          </a:sp3d>
+        </a:effectStyle>
+      </a:effectStyleLst>
+      <a:bgFillStyleLst>
+        <a:solidFill>
+          <a:schemeClr val="phClr"/>
+        </a:solidFill>
+        <a:gradFill rotWithShape="1">
+          <a:gsLst>
+            <a:gs pos="0">
+              <a:schemeClr val="phClr">
+                <a:tint val="40000"/>
+                <a:satMod val="350000"/>
+              </a:schemeClr>
+            </a:gs>
+            <a:gs pos="40000">
+              <a:schemeClr val="phClr">
+                <a:tint val="45000"/>
+                <a:shade val="99000"/>
+                <a:satMod val="350000"/>
+              </a:schemeClr>
+            </a:gs>
+            <a:gs pos="100000">
+              <a:schemeClr val="phClr">
+                <a:shade val="20000"/>
+                <a:satMod val="255000"/>
+              </a:schemeClr>
+            </a:gs>
+          </a:gsLst>
+          <a:path path="circle">
+            <a:fillToRect l="50000" t="-80000" r="50000" b="180000"/>
+          </a:path>
+        </a:gradFill>
+        <a:gradFill rotWithShape="1">
+          <a:gsLst>
+            <a:gs pos="0">
+              <a:schemeClr val="phClr">
+                <a:tint val="80000"/>
+                <a:satMod val="300000"/>
+              </a:schemeClr>
+            </a:gs>
+            <a:gs pos="100000">
+              <a:schemeClr val="phClr">
+                <a:shade val="30000"/>
+                <a:satMod val="200000"/>
+              </a:schemeClr>
+            </a:gs>
+          </a:gsLst>
+          <a:path path="circle">
+            <a:fillToRect l="50000" t="50000" r="50000" b="50000"/>
+          </a:path>
+        </a:gradFill>
+      </a:bgFillStyleLst>
+    </a:fmtScheme>
+  </a:themeElements>
+  <a:objectDefaults/>
+  <a:extraClrSchemeLst/>
+</a:theme>
 </file>
</xml_diff>